<commit_message>
Drafted presentation; final touches to model.ipynb
</commit_message>
<xml_diff>
--- a/presentation.pptx
+++ b/presentation.pptx
@@ -4,6 +4,9 @@
   <p:sldMasterIdLst>
     <p:sldMasterId id="2147483648" r:id="rId1"/>
   </p:sldMasterIdLst>
+  <p:notesMasterIdLst>
+    <p:notesMasterId r:id="rId6"/>
+  </p:notesMasterIdLst>
   <p:sldIdLst>
     <p:sldId id="256" r:id="rId2"/>
     <p:sldId id="257" r:id="rId3"/>
@@ -107,7 +110,445 @@
       </a:defRPr>
     </a:lvl9pPr>
   </p:defaultTextStyle>
+  <p:extLst>
+    <p:ext uri="{EFAFB233-063F-42B5-8137-9DF3F51BA10A}">
+      <p15:sldGuideLst xmlns:p15="http://schemas.microsoft.com/office/powerpoint/2012/main"/>
+    </p:ext>
+  </p:extLst>
 </p:presentation>
+</file>
+
+<file path=ppt/notesMasters/notesMaster1.xml><?xml version="1.0" encoding="utf-8"?>
+<p:notesMaster xmlns:a="http://schemas.openxmlformats.org/drawingml/2006/main" xmlns:r="http://schemas.openxmlformats.org/officeDocument/2006/relationships" xmlns:p="http://schemas.openxmlformats.org/presentationml/2006/main">
+  <p:cSld>
+    <p:bg>
+      <p:bgRef idx="1001">
+        <a:schemeClr val="bg1"/>
+      </p:bgRef>
+    </p:bg>
+    <p:spTree>
+      <p:nvGrpSpPr>
+        <p:cNvPr id="1" name=""/>
+        <p:cNvGrpSpPr/>
+        <p:nvPr/>
+      </p:nvGrpSpPr>
+      <p:grpSpPr>
+        <a:xfrm>
+          <a:off x="0" y="0"/>
+          <a:ext cx="0" cy="0"/>
+          <a:chOff x="0" y="0"/>
+          <a:chExt cx="0" cy="0"/>
+        </a:xfrm>
+      </p:grpSpPr>
+      <p:sp>
+        <p:nvSpPr>
+          <p:cNvPr id="2" name="Header Placeholder 1"/>
+          <p:cNvSpPr>
+            <a:spLocks noGrp="1"/>
+          </p:cNvSpPr>
+          <p:nvPr>
+            <p:ph type="hdr" sz="quarter"/>
+          </p:nvPr>
+        </p:nvSpPr>
+        <p:spPr>
+          <a:xfrm>
+            <a:off x="0" y="0"/>
+            <a:ext cx="2971800" cy="458788"/>
+          </a:xfrm>
+          <a:prstGeom prst="rect">
+            <a:avLst/>
+          </a:prstGeom>
+        </p:spPr>
+        <p:txBody>
+          <a:bodyPr vert="horz" lIns="91440" tIns="45720" rIns="91440" bIns="45720" rtlCol="0"/>
+          <a:lstStyle>
+            <a:lvl1pPr algn="l">
+              <a:defRPr sz="1200"/>
+            </a:lvl1pPr>
+          </a:lstStyle>
+          <a:p>
+            <a:endParaRPr lang="en-US"/>
+          </a:p>
+        </p:txBody>
+      </p:sp>
+      <p:sp>
+        <p:nvSpPr>
+          <p:cNvPr id="3" name="Date Placeholder 2"/>
+          <p:cNvSpPr>
+            <a:spLocks noGrp="1"/>
+          </p:cNvSpPr>
+          <p:nvPr>
+            <p:ph type="dt" idx="1"/>
+          </p:nvPr>
+        </p:nvSpPr>
+        <p:spPr>
+          <a:xfrm>
+            <a:off x="3884613" y="0"/>
+            <a:ext cx="2971800" cy="458788"/>
+          </a:xfrm>
+          <a:prstGeom prst="rect">
+            <a:avLst/>
+          </a:prstGeom>
+        </p:spPr>
+        <p:txBody>
+          <a:bodyPr vert="horz" lIns="91440" tIns="45720" rIns="91440" bIns="45720" rtlCol="0"/>
+          <a:lstStyle>
+            <a:lvl1pPr algn="r">
+              <a:defRPr sz="1200"/>
+            </a:lvl1pPr>
+          </a:lstStyle>
+          <a:p>
+            <a:fld id="{F9548F8E-26F3-4F60-83EC-179C94C331BD}" type="datetimeFigureOut">
+              <a:rPr lang="en-US" smtClean="0"/>
+              <a:t>6/2/2025</a:t>
+            </a:fld>
+            <a:endParaRPr lang="en-US"/>
+          </a:p>
+        </p:txBody>
+      </p:sp>
+      <p:sp>
+        <p:nvSpPr>
+          <p:cNvPr id="4" name="Slide Image Placeholder 3"/>
+          <p:cNvSpPr>
+            <a:spLocks noGrp="1" noRot="1" noChangeAspect="1"/>
+          </p:cNvSpPr>
+          <p:nvPr>
+            <p:ph type="sldImg" idx="2"/>
+          </p:nvPr>
+        </p:nvSpPr>
+        <p:spPr>
+          <a:xfrm>
+            <a:off x="685800" y="1143000"/>
+            <a:ext cx="5486400" cy="3086100"/>
+          </a:xfrm>
+          <a:prstGeom prst="rect">
+            <a:avLst/>
+          </a:prstGeom>
+          <a:noFill/>
+          <a:ln w="12700">
+            <a:solidFill>
+              <a:prstClr val="black"/>
+            </a:solidFill>
+          </a:ln>
+        </p:spPr>
+        <p:txBody>
+          <a:bodyPr vert="horz" lIns="91440" tIns="45720" rIns="91440" bIns="45720" rtlCol="0" anchor="ctr"/>
+          <a:lstStyle/>
+          <a:p>
+            <a:endParaRPr lang="en-US"/>
+          </a:p>
+        </p:txBody>
+      </p:sp>
+      <p:sp>
+        <p:nvSpPr>
+          <p:cNvPr id="5" name="Notes Placeholder 4"/>
+          <p:cNvSpPr>
+            <a:spLocks noGrp="1"/>
+          </p:cNvSpPr>
+          <p:nvPr>
+            <p:ph type="body" sz="quarter" idx="3"/>
+          </p:nvPr>
+        </p:nvSpPr>
+        <p:spPr>
+          <a:xfrm>
+            <a:off x="685800" y="4400550"/>
+            <a:ext cx="5486400" cy="3600450"/>
+          </a:xfrm>
+          <a:prstGeom prst="rect">
+            <a:avLst/>
+          </a:prstGeom>
+        </p:spPr>
+        <p:txBody>
+          <a:bodyPr vert="horz" lIns="91440" tIns="45720" rIns="91440" bIns="45720" rtlCol="0"/>
+          <a:lstStyle/>
+          <a:p>
+            <a:pPr lvl="0"/>
+            <a:r>
+              <a:rPr lang="en-US"/>
+              <a:t>Click to edit Master text styles</a:t>
+            </a:r>
+          </a:p>
+          <a:p>
+            <a:pPr lvl="1"/>
+            <a:r>
+              <a:rPr lang="en-US"/>
+              <a:t>Second level</a:t>
+            </a:r>
+          </a:p>
+          <a:p>
+            <a:pPr lvl="2"/>
+            <a:r>
+              <a:rPr lang="en-US"/>
+              <a:t>Third level</a:t>
+            </a:r>
+          </a:p>
+          <a:p>
+            <a:pPr lvl="3"/>
+            <a:r>
+              <a:rPr lang="en-US"/>
+              <a:t>Fourth level</a:t>
+            </a:r>
+          </a:p>
+          <a:p>
+            <a:pPr lvl="4"/>
+            <a:r>
+              <a:rPr lang="en-US"/>
+              <a:t>Fifth level</a:t>
+            </a:r>
+          </a:p>
+        </p:txBody>
+      </p:sp>
+      <p:sp>
+        <p:nvSpPr>
+          <p:cNvPr id="6" name="Footer Placeholder 5"/>
+          <p:cNvSpPr>
+            <a:spLocks noGrp="1"/>
+          </p:cNvSpPr>
+          <p:nvPr>
+            <p:ph type="ftr" sz="quarter" idx="4"/>
+          </p:nvPr>
+        </p:nvSpPr>
+        <p:spPr>
+          <a:xfrm>
+            <a:off x="0" y="8685213"/>
+            <a:ext cx="2971800" cy="458787"/>
+          </a:xfrm>
+          <a:prstGeom prst="rect">
+            <a:avLst/>
+          </a:prstGeom>
+        </p:spPr>
+        <p:txBody>
+          <a:bodyPr vert="horz" lIns="91440" tIns="45720" rIns="91440" bIns="45720" rtlCol="0" anchor="b"/>
+          <a:lstStyle>
+            <a:lvl1pPr algn="l">
+              <a:defRPr sz="1200"/>
+            </a:lvl1pPr>
+          </a:lstStyle>
+          <a:p>
+            <a:endParaRPr lang="en-US"/>
+          </a:p>
+        </p:txBody>
+      </p:sp>
+      <p:sp>
+        <p:nvSpPr>
+          <p:cNvPr id="7" name="Slide Number Placeholder 6"/>
+          <p:cNvSpPr>
+            <a:spLocks noGrp="1"/>
+          </p:cNvSpPr>
+          <p:nvPr>
+            <p:ph type="sldNum" sz="quarter" idx="5"/>
+          </p:nvPr>
+        </p:nvSpPr>
+        <p:spPr>
+          <a:xfrm>
+            <a:off x="3884613" y="8685213"/>
+            <a:ext cx="2971800" cy="458787"/>
+          </a:xfrm>
+          <a:prstGeom prst="rect">
+            <a:avLst/>
+          </a:prstGeom>
+        </p:spPr>
+        <p:txBody>
+          <a:bodyPr vert="horz" lIns="91440" tIns="45720" rIns="91440" bIns="45720" rtlCol="0" anchor="b"/>
+          <a:lstStyle>
+            <a:lvl1pPr algn="r">
+              <a:defRPr sz="1200"/>
+            </a:lvl1pPr>
+          </a:lstStyle>
+          <a:p>
+            <a:fld id="{31E35DCD-1074-43C6-A9AC-D50F066580F6}" type="slidenum">
+              <a:rPr lang="en-US" smtClean="0"/>
+              <a:t>‹#›</a:t>
+            </a:fld>
+            <a:endParaRPr lang="en-US"/>
+          </a:p>
+        </p:txBody>
+      </p:sp>
+    </p:spTree>
+    <p:extLst>
+      <p:ext uri="{BB962C8B-B14F-4D97-AF65-F5344CB8AC3E}">
+        <p14:creationId xmlns:p14="http://schemas.microsoft.com/office/powerpoint/2010/main" val="3557192614"/>
+      </p:ext>
+    </p:extLst>
+  </p:cSld>
+  <p:clrMap bg1="lt1" tx1="dk1" bg2="lt2" tx2="dk2" accent1="accent1" accent2="accent2" accent3="accent3" accent4="accent4" accent5="accent5" accent6="accent6" hlink="hlink" folHlink="folHlink"/>
+  <p:notesStyle>
+    <a:lvl1pPr marL="0" algn="l" defTabSz="914400" rtl="0" eaLnBrk="1" latinLnBrk="0" hangingPunct="1">
+      <a:defRPr sz="1200" kern="1200">
+        <a:solidFill>
+          <a:schemeClr val="tx1"/>
+        </a:solidFill>
+        <a:latin typeface="+mn-lt"/>
+        <a:ea typeface="+mn-ea"/>
+        <a:cs typeface="+mn-cs"/>
+      </a:defRPr>
+    </a:lvl1pPr>
+    <a:lvl2pPr marL="457200" algn="l" defTabSz="914400" rtl="0" eaLnBrk="1" latinLnBrk="0" hangingPunct="1">
+      <a:defRPr sz="1200" kern="1200">
+        <a:solidFill>
+          <a:schemeClr val="tx1"/>
+        </a:solidFill>
+        <a:latin typeface="+mn-lt"/>
+        <a:ea typeface="+mn-ea"/>
+        <a:cs typeface="+mn-cs"/>
+      </a:defRPr>
+    </a:lvl2pPr>
+    <a:lvl3pPr marL="914400" algn="l" defTabSz="914400" rtl="0" eaLnBrk="1" latinLnBrk="0" hangingPunct="1">
+      <a:defRPr sz="1200" kern="1200">
+        <a:solidFill>
+          <a:schemeClr val="tx1"/>
+        </a:solidFill>
+        <a:latin typeface="+mn-lt"/>
+        <a:ea typeface="+mn-ea"/>
+        <a:cs typeface="+mn-cs"/>
+      </a:defRPr>
+    </a:lvl3pPr>
+    <a:lvl4pPr marL="1371600" algn="l" defTabSz="914400" rtl="0" eaLnBrk="1" latinLnBrk="0" hangingPunct="1">
+      <a:defRPr sz="1200" kern="1200">
+        <a:solidFill>
+          <a:schemeClr val="tx1"/>
+        </a:solidFill>
+        <a:latin typeface="+mn-lt"/>
+        <a:ea typeface="+mn-ea"/>
+        <a:cs typeface="+mn-cs"/>
+      </a:defRPr>
+    </a:lvl4pPr>
+    <a:lvl5pPr marL="1828800" algn="l" defTabSz="914400" rtl="0" eaLnBrk="1" latinLnBrk="0" hangingPunct="1">
+      <a:defRPr sz="1200" kern="1200">
+        <a:solidFill>
+          <a:schemeClr val="tx1"/>
+        </a:solidFill>
+        <a:latin typeface="+mn-lt"/>
+        <a:ea typeface="+mn-ea"/>
+        <a:cs typeface="+mn-cs"/>
+      </a:defRPr>
+    </a:lvl5pPr>
+    <a:lvl6pPr marL="2286000" algn="l" defTabSz="914400" rtl="0" eaLnBrk="1" latinLnBrk="0" hangingPunct="1">
+      <a:defRPr sz="1200" kern="1200">
+        <a:solidFill>
+          <a:schemeClr val="tx1"/>
+        </a:solidFill>
+        <a:latin typeface="+mn-lt"/>
+        <a:ea typeface="+mn-ea"/>
+        <a:cs typeface="+mn-cs"/>
+      </a:defRPr>
+    </a:lvl6pPr>
+    <a:lvl7pPr marL="2743200" algn="l" defTabSz="914400" rtl="0" eaLnBrk="1" latinLnBrk="0" hangingPunct="1">
+      <a:defRPr sz="1200" kern="1200">
+        <a:solidFill>
+          <a:schemeClr val="tx1"/>
+        </a:solidFill>
+        <a:latin typeface="+mn-lt"/>
+        <a:ea typeface="+mn-ea"/>
+        <a:cs typeface="+mn-cs"/>
+      </a:defRPr>
+    </a:lvl7pPr>
+    <a:lvl8pPr marL="3200400" algn="l" defTabSz="914400" rtl="0" eaLnBrk="1" latinLnBrk="0" hangingPunct="1">
+      <a:defRPr sz="1200" kern="1200">
+        <a:solidFill>
+          <a:schemeClr val="tx1"/>
+        </a:solidFill>
+        <a:latin typeface="+mn-lt"/>
+        <a:ea typeface="+mn-ea"/>
+        <a:cs typeface="+mn-cs"/>
+      </a:defRPr>
+    </a:lvl8pPr>
+    <a:lvl9pPr marL="3657600" algn="l" defTabSz="914400" rtl="0" eaLnBrk="1" latinLnBrk="0" hangingPunct="1">
+      <a:defRPr sz="1200" kern="1200">
+        <a:solidFill>
+          <a:schemeClr val="tx1"/>
+        </a:solidFill>
+        <a:latin typeface="+mn-lt"/>
+        <a:ea typeface="+mn-ea"/>
+        <a:cs typeface="+mn-cs"/>
+      </a:defRPr>
+    </a:lvl9pPr>
+  </p:notesStyle>
+</p:notesMaster>
+</file>
+
+<file path=ppt/notesSlides/notesSlide1.xml><?xml version="1.0" encoding="utf-8"?>
+<p:notes xmlns:a="http://schemas.openxmlformats.org/drawingml/2006/main" xmlns:r="http://schemas.openxmlformats.org/officeDocument/2006/relationships" xmlns:p="http://schemas.openxmlformats.org/presentationml/2006/main">
+  <p:cSld>
+    <p:spTree>
+      <p:nvGrpSpPr>
+        <p:cNvPr id="1" name=""/>
+        <p:cNvGrpSpPr/>
+        <p:nvPr/>
+      </p:nvGrpSpPr>
+      <p:grpSpPr>
+        <a:xfrm>
+          <a:off x="0" y="0"/>
+          <a:ext cx="0" cy="0"/>
+          <a:chOff x="0" y="0"/>
+          <a:chExt cx="0" cy="0"/>
+        </a:xfrm>
+      </p:grpSpPr>
+      <p:sp>
+        <p:nvSpPr>
+          <p:cNvPr id="2" name="Slide Image Placeholder 1"/>
+          <p:cNvSpPr>
+            <a:spLocks noGrp="1" noRot="1" noChangeAspect="1"/>
+          </p:cNvSpPr>
+          <p:nvPr>
+            <p:ph type="sldImg"/>
+          </p:nvPr>
+        </p:nvSpPr>
+        <p:spPr/>
+      </p:sp>
+      <p:sp>
+        <p:nvSpPr>
+          <p:cNvPr id="3" name="Notes Placeholder 2"/>
+          <p:cNvSpPr>
+            <a:spLocks noGrp="1"/>
+          </p:cNvSpPr>
+          <p:nvPr>
+            <p:ph type="body" idx="1"/>
+          </p:nvPr>
+        </p:nvSpPr>
+        <p:spPr/>
+        <p:txBody>
+          <a:bodyPr/>
+          <a:lstStyle/>
+          <a:p>
+            <a:endParaRPr lang="en-US" dirty="0"/>
+          </a:p>
+        </p:txBody>
+      </p:sp>
+      <p:sp>
+        <p:nvSpPr>
+          <p:cNvPr id="4" name="Slide Number Placeholder 3"/>
+          <p:cNvSpPr>
+            <a:spLocks noGrp="1"/>
+          </p:cNvSpPr>
+          <p:nvPr>
+            <p:ph type="sldNum" sz="quarter" idx="5"/>
+          </p:nvPr>
+        </p:nvSpPr>
+        <p:spPr/>
+        <p:txBody>
+          <a:bodyPr/>
+          <a:lstStyle/>
+          <a:p>
+            <a:fld id="{31E35DCD-1074-43C6-A9AC-D50F066580F6}" type="slidenum">
+              <a:rPr lang="en-US" smtClean="0"/>
+              <a:t>4</a:t>
+            </a:fld>
+            <a:endParaRPr lang="en-US"/>
+          </a:p>
+        </p:txBody>
+      </p:sp>
+    </p:spTree>
+    <p:extLst>
+      <p:ext uri="{BB962C8B-B14F-4D97-AF65-F5344CB8AC3E}">
+        <p14:creationId xmlns:p14="http://schemas.microsoft.com/office/powerpoint/2010/main" val="2328538629"/>
+      </p:ext>
+    </p:extLst>
+  </p:cSld>
+  <p:clrMapOvr>
+    <a:masterClrMapping/>
+  </p:clrMapOvr>
+</p:notes>
 </file>
 
 <file path=ppt/slideLayouts/slideLayout1.xml><?xml version="1.0" encoding="utf-8"?>
@@ -257,7 +698,7 @@
           <a:p>
             <a:fld id="{069F03E5-9147-4BDF-8C50-2070D0B384CC}" type="datetimeFigureOut">
               <a:rPr lang="en-US" smtClean="0"/>
-              <a:t>6/1/2025</a:t>
+              <a:t>6/2/2025</a:t>
             </a:fld>
             <a:endParaRPr lang="en-US"/>
           </a:p>
@@ -455,7 +896,7 @@
           <a:p>
             <a:fld id="{069F03E5-9147-4BDF-8C50-2070D0B384CC}" type="datetimeFigureOut">
               <a:rPr lang="en-US" smtClean="0"/>
-              <a:t>6/1/2025</a:t>
+              <a:t>6/2/2025</a:t>
             </a:fld>
             <a:endParaRPr lang="en-US"/>
           </a:p>
@@ -663,7 +1104,7 @@
           <a:p>
             <a:fld id="{069F03E5-9147-4BDF-8C50-2070D0B384CC}" type="datetimeFigureOut">
               <a:rPr lang="en-US" smtClean="0"/>
-              <a:t>6/1/2025</a:t>
+              <a:t>6/2/2025</a:t>
             </a:fld>
             <a:endParaRPr lang="en-US"/>
           </a:p>
@@ -861,7 +1302,7 @@
           <a:p>
             <a:fld id="{069F03E5-9147-4BDF-8C50-2070D0B384CC}" type="datetimeFigureOut">
               <a:rPr lang="en-US" smtClean="0"/>
-              <a:t>6/1/2025</a:t>
+              <a:t>6/2/2025</a:t>
             </a:fld>
             <a:endParaRPr lang="en-US"/>
           </a:p>
@@ -1136,7 +1577,7 @@
           <a:p>
             <a:fld id="{069F03E5-9147-4BDF-8C50-2070D0B384CC}" type="datetimeFigureOut">
               <a:rPr lang="en-US" smtClean="0"/>
-              <a:t>6/1/2025</a:t>
+              <a:t>6/2/2025</a:t>
             </a:fld>
             <a:endParaRPr lang="en-US"/>
           </a:p>
@@ -1401,7 +1842,7 @@
           <a:p>
             <a:fld id="{069F03E5-9147-4BDF-8C50-2070D0B384CC}" type="datetimeFigureOut">
               <a:rPr lang="en-US" smtClean="0"/>
-              <a:t>6/1/2025</a:t>
+              <a:t>6/2/2025</a:t>
             </a:fld>
             <a:endParaRPr lang="en-US"/>
           </a:p>
@@ -1813,7 +2254,7 @@
           <a:p>
             <a:fld id="{069F03E5-9147-4BDF-8C50-2070D0B384CC}" type="datetimeFigureOut">
               <a:rPr lang="en-US" smtClean="0"/>
-              <a:t>6/1/2025</a:t>
+              <a:t>6/2/2025</a:t>
             </a:fld>
             <a:endParaRPr lang="en-US"/>
           </a:p>
@@ -1954,7 +2395,7 @@
           <a:p>
             <a:fld id="{069F03E5-9147-4BDF-8C50-2070D0B384CC}" type="datetimeFigureOut">
               <a:rPr lang="en-US" smtClean="0"/>
-              <a:t>6/1/2025</a:t>
+              <a:t>6/2/2025</a:t>
             </a:fld>
             <a:endParaRPr lang="en-US"/>
           </a:p>
@@ -2067,7 +2508,7 @@
           <a:p>
             <a:fld id="{069F03E5-9147-4BDF-8C50-2070D0B384CC}" type="datetimeFigureOut">
               <a:rPr lang="en-US" smtClean="0"/>
-              <a:t>6/1/2025</a:t>
+              <a:t>6/2/2025</a:t>
             </a:fld>
             <a:endParaRPr lang="en-US"/>
           </a:p>
@@ -2378,7 +2819,7 @@
           <a:p>
             <a:fld id="{069F03E5-9147-4BDF-8C50-2070D0B384CC}" type="datetimeFigureOut">
               <a:rPr lang="en-US" smtClean="0"/>
-              <a:t>6/1/2025</a:t>
+              <a:t>6/2/2025</a:t>
             </a:fld>
             <a:endParaRPr lang="en-US"/>
           </a:p>
@@ -2666,7 +3107,7 @@
           <a:p>
             <a:fld id="{069F03E5-9147-4BDF-8C50-2070D0B384CC}" type="datetimeFigureOut">
               <a:rPr lang="en-US" smtClean="0"/>
-              <a:t>6/1/2025</a:t>
+              <a:t>6/2/2025</a:t>
             </a:fld>
             <a:endParaRPr lang="en-US"/>
           </a:p>
@@ -2907,7 +3348,7 @@
           <a:p>
             <a:fld id="{069F03E5-9147-4BDF-8C50-2070D0B384CC}" type="datetimeFigureOut">
               <a:rPr lang="en-US" smtClean="0"/>
-              <a:t>6/1/2025</a:t>
+              <a:t>6/2/2025</a:t>
             </a:fld>
             <a:endParaRPr lang="en-US"/>
           </a:p>
@@ -3412,7 +3853,12 @@
             <p:ph type="title"/>
           </p:nvPr>
         </p:nvSpPr>
-        <p:spPr/>
+        <p:spPr>
+          <a:xfrm>
+            <a:off x="838200" y="288922"/>
+            <a:ext cx="10515600" cy="1325563"/>
+          </a:xfrm>
+        </p:spPr>
         <p:txBody>
           <a:bodyPr/>
           <a:lstStyle/>
@@ -3444,8 +3890,8 @@
             </p:nvSpPr>
             <p:spPr>
               <a:xfrm>
-                <a:off x="829733" y="2730915"/>
-                <a:ext cx="6697132" cy="2806278"/>
+                <a:off x="567266" y="2452347"/>
+                <a:ext cx="9186334" cy="4270186"/>
               </a:xfrm>
             </p:spPr>
             <p:txBody>
@@ -3675,13 +4121,13 @@
                 </a14:m>
                 <a:r>
                   <a:rPr lang="en-US" sz="2000" dirty="0"/>
-                  <a:t> term, i.e. shorting is allowed for this model. We will need to compare the models that do and do not include this constraint. </a:t>
+                  <a:t> term, i.e. shorting is allowed for this                                          model. However, shorting stocks can create many                                                        complications that are outside of the range of this project, so                                                          we will observe this model as our basis, but quickly move to                                                         the model include the nonnegativity constraint.</a:t>
                 </a:r>
               </a:p>
               <a:p>
                 <a:r>
                   <a:rPr lang="en-US" sz="2000" dirty="0"/>
-                  <a:t>Our goal is to plot and compare the efficient frontiers for the basic model and for models with extra penalty terms.</a:t>
+                  <a:t>Our goal is to plot and compare the efficient frontiers for the                                                      basic model and for models with extra penalty terms.</a:t>
                 </a:r>
               </a:p>
               <a:p>
@@ -3753,7 +4199,7 @@
                 </a14:m>
                 <a:r>
                   <a:rPr lang="en-US" sz="2000" dirty="0"/>
-                  <a:t> (sensitivity) penalties.</a:t>
+                  <a:t> (sensitivity) norms.</a:t>
                 </a:r>
               </a:p>
             </p:txBody>
@@ -3778,13 +4224,13 @@
             </p:nvSpPr>
             <p:spPr>
               <a:xfrm>
-                <a:off x="829733" y="2730915"/>
-                <a:ext cx="6697132" cy="2806278"/>
+                <a:off x="567266" y="2452347"/>
+                <a:ext cx="9186334" cy="4270186"/>
               </a:xfrm>
               <a:blipFill>
                 <a:blip r:embed="rId2"/>
                 <a:stretch>
-                  <a:fillRect l="-819" t="-2174" b="-35435"/>
+                  <a:fillRect l="-597" t="-1284" r="-10352"/>
                 </a:stretch>
               </a:blipFill>
             </p:spPr>
@@ -3817,7 +4263,7 @@
         </p:nvSpPr>
         <p:spPr>
           <a:xfrm>
-            <a:off x="7967133" y="2713986"/>
+            <a:off x="7939958" y="2298673"/>
             <a:ext cx="3657600" cy="1200329"/>
           </a:xfrm>
           <a:prstGeom prst="rect">
@@ -3886,7 +4332,7 @@
         </p:nvSpPr>
         <p:spPr>
           <a:xfrm>
-            <a:off x="677332" y="1597551"/>
+            <a:off x="677332" y="1419750"/>
             <a:ext cx="10515600" cy="1015663"/>
           </a:xfrm>
           <a:prstGeom prst="rect">
@@ -3935,7 +4381,7 @@
         </p:blipFill>
         <p:spPr>
           <a:xfrm>
-            <a:off x="7633372" y="4183191"/>
+            <a:off x="7692639" y="3692124"/>
             <a:ext cx="4270772" cy="2135386"/>
           </a:xfrm>
           <a:prstGeom prst="rect">
@@ -4021,8 +4467,8 @@
             </p:nvSpPr>
             <p:spPr>
               <a:xfrm>
-                <a:off x="838200" y="1614918"/>
-                <a:ext cx="10515600" cy="1974949"/>
+                <a:off x="838200" y="1614919"/>
+                <a:ext cx="10515600" cy="1814082"/>
               </a:xfrm>
             </p:spPr>
             <p:txBody>
@@ -4338,7 +4784,7 @@
                     <m:d>
                       <m:dPr>
                         <m:ctrlPr>
-                          <a:rPr lang="en-US" sz="1800" b="0" i="0" smtClean="0">
+                          <a:rPr lang="en-US" sz="1800" b="0" i="1" smtClean="0">
                             <a:latin typeface="Cambria Math" panose="02040503050406030204" pitchFamily="18" charset="0"/>
                           </a:rPr>
                         </m:ctrlPr>
@@ -4832,13 +5278,13 @@
             </p:nvSpPr>
             <p:spPr>
               <a:xfrm>
-                <a:off x="838200" y="1614918"/>
-                <a:ext cx="10515600" cy="1974949"/>
+                <a:off x="838200" y="1614919"/>
+                <a:ext cx="10515600" cy="1814082"/>
               </a:xfrm>
               <a:blipFill>
                 <a:blip r:embed="rId2"/>
                 <a:stretch>
-                  <a:fillRect l="-406" t="-3086"/>
+                  <a:fillRect l="-406" t="-3356"/>
                 </a:stretch>
               </a:blipFill>
             </p:spPr>
@@ -4857,8 +5303,8 @@
           </p:sp>
         </mc:Fallback>
       </mc:AlternateContent>
-      <mc:AlternateContent xmlns:mc="http://schemas.openxmlformats.org/markup-compatibility/2006">
-        <mc:Choice xmlns:a14="http://schemas.microsoft.com/office/drawing/2010/main" Requires="a14">
+      <mc:AlternateContent xmlns:mc="http://schemas.openxmlformats.org/markup-compatibility/2006" xmlns:a14="http://schemas.microsoft.com/office/drawing/2010/main">
+        <mc:Choice Requires="a14">
           <p:sp>
             <p:nvSpPr>
               <p:cNvPr id="4" name="TextBox 3">
@@ -5073,7 +5519,7 @@
             </p:txBody>
           </p:sp>
         </mc:Choice>
-        <mc:Fallback>
+        <mc:Fallback xmlns="">
           <p:sp>
             <p:nvSpPr>
               <p:cNvPr id="4" name="TextBox 3">
@@ -5118,8 +5564,8 @@
           </p:sp>
         </mc:Fallback>
       </mc:AlternateContent>
-      <mc:AlternateContent xmlns:mc="http://schemas.openxmlformats.org/markup-compatibility/2006">
-        <mc:Choice xmlns:a14="http://schemas.microsoft.com/office/drawing/2010/main" Requires="a14">
+      <mc:AlternateContent xmlns:mc="http://schemas.openxmlformats.org/markup-compatibility/2006" xmlns:a14="http://schemas.microsoft.com/office/drawing/2010/main">
+        <mc:Choice Requires="a14">
           <p:sp>
             <p:nvSpPr>
               <p:cNvPr id="5" name="TextBox 4">
@@ -5148,6 +5594,7 @@
               </a:bodyPr>
               <a:lstStyle/>
               <a:p>
+                <a:pPr/>
                 <a14:m>
                   <m:oMathPara xmlns:m="http://schemas.openxmlformats.org/officeDocument/2006/math">
                     <m:oMathParaPr>
@@ -5179,7 +5626,13 @@
                               <a:rPr lang="en-US" b="0" i="1" smtClean="0">
                                 <a:latin typeface="Cambria Math" panose="02040503050406030204" pitchFamily="18" charset="0"/>
                               </a:rPr>
-                              <m:t>(1)</m:t>
+                              <m:t>(</m:t>
+                            </m:r>
+                            <m:r>
+                              <a:rPr lang="en-US" b="0" i="1" smtClean="0">
+                                <a:latin typeface="Cambria Math" panose="02040503050406030204" pitchFamily="18" charset="0"/>
+                              </a:rPr>
+                              <m:t>1)</m:t>
                             </m:r>
                           </m:e>
                         </m:mr>
@@ -5202,7 +5655,7 @@
             </p:txBody>
           </p:sp>
         </mc:Choice>
-        <mc:Fallback>
+        <mc:Fallback xmlns="">
           <p:sp>
             <p:nvSpPr>
               <p:cNvPr id="5" name="TextBox 4">
@@ -5263,8 +5716,8 @@
             </p:nvSpPr>
             <p:spPr>
               <a:xfrm>
-                <a:off x="838200" y="3293528"/>
-                <a:ext cx="5367867" cy="2585323"/>
+                <a:off x="644434" y="3287402"/>
+                <a:ext cx="5451566" cy="2585323"/>
               </a:xfrm>
               <a:prstGeom prst="rect">
                 <a:avLst/>
@@ -5528,8 +5981,8 @@
             </p:nvSpPr>
             <p:spPr>
               <a:xfrm>
-                <a:off x="838200" y="3293528"/>
-                <a:ext cx="5367867" cy="2585323"/>
+                <a:off x="644434" y="3287402"/>
+                <a:ext cx="5451566" cy="2585323"/>
               </a:xfrm>
               <a:prstGeom prst="rect">
                 <a:avLst/>
@@ -5537,7 +5990,7 @@
               <a:blipFill>
                 <a:blip r:embed="rId5"/>
                 <a:stretch>
-                  <a:fillRect l="-795" t="-943" r="-1705"/>
+                  <a:fillRect l="-783" t="-943" r="-783"/>
                 </a:stretch>
               </a:blipFill>
             </p:spPr>
@@ -5560,10 +6013,10 @@
         <mc:Choice xmlns:a14="http://schemas.microsoft.com/office/drawing/2010/main" Requires="a14">
           <p:sp>
             <p:nvSpPr>
-              <p:cNvPr id="7" name="TextBox 6">
+              <p:cNvPr id="8" name="TextBox 7">
                 <a:extLst>
                   <a:ext uri="{FF2B5EF4-FFF2-40B4-BE49-F238E27FC236}">
-                    <a16:creationId xmlns:a16="http://schemas.microsoft.com/office/drawing/2014/main" id="{E543C580-8BEB-2F8A-57BD-0EFA589E8917}"/>
+                    <a16:creationId xmlns:a16="http://schemas.microsoft.com/office/drawing/2014/main" id="{8770405C-0394-2E82-6348-0B3B46D85371}"/>
                   </a:ext>
                 </a:extLst>
               </p:cNvPr>
@@ -5572,8 +6025,8 @@
             </p:nvSpPr>
             <p:spPr>
               <a:xfrm>
-                <a:off x="6434664" y="3293528"/>
-                <a:ext cx="5249333" cy="3643433"/>
+                <a:off x="6460067" y="3287402"/>
+                <a:ext cx="5087499" cy="2741520"/>
               </a:xfrm>
               <a:prstGeom prst="rect">
                 <a:avLst/>
@@ -5592,666 +6045,211 @@
                 </a:pPr>
                 <a:r>
                   <a:rPr lang="en-US" dirty="0"/>
-                  <a:t>After solving this problem, we can begin to extend the model the compare results. Our extensions will include </a:t>
+                  <a:t>As well, since the original model can be solved using only linear algebra, an optimal solution exists for any fixed R, but our new model is not so simple. We can only find an optimal solution for the no shorting model in the interval defined by</a:t>
                 </a:r>
               </a:p>
               <a:p>
-                <a:pPr marL="742950" lvl="1" indent="-285750">
-                  <a:buFont typeface="Arial" panose="020B0604020202020204" pitchFamily="34" charset="0"/>
-                  <a:buChar char="•"/>
-                </a:pPr>
-                <a:r>
-                  <a:rPr lang="en-US" dirty="0"/>
-                  <a:t>a risk-free asset model:</a:t>
-                </a:r>
-              </a:p>
-              <a:p>
-                <a:pPr lvl="1"/>
-                <a:r>
-                  <a:rPr lang="en-US" dirty="0"/>
-                  <a:t>	          minimize </a:t>
-                </a:r>
                 <a14:m>
-                  <m:oMath xmlns:m="http://schemas.openxmlformats.org/officeDocument/2006/math">
-                    <m:sSup>
-                      <m:sSupPr>
-                        <m:ctrlPr>
-                          <a:rPr lang="en-US" b="0" i="1" smtClean="0">
-                            <a:latin typeface="Cambria Math" panose="02040503050406030204" pitchFamily="18" charset="0"/>
-                          </a:rPr>
-                        </m:ctrlPr>
-                      </m:sSupPr>
-                      <m:e>
-                        <m:r>
-                          <a:rPr lang="en-US" b="0" i="1" smtClean="0">
-                            <a:latin typeface="Cambria Math" panose="02040503050406030204" pitchFamily="18" charset="0"/>
-                          </a:rPr>
-                          <m:t>𝑥</m:t>
-                        </m:r>
-                      </m:e>
-                      <m:sup>
-                        <m:r>
-                          <a:rPr lang="en-US" b="0" i="1" smtClean="0">
-                            <a:latin typeface="Cambria Math" panose="02040503050406030204" pitchFamily="18" charset="0"/>
-                          </a:rPr>
-                          <m:t>𝑇</m:t>
-                        </m:r>
-                      </m:sup>
-                    </m:sSup>
-                    <m:r>
-                      <m:rPr>
-                        <m:sty m:val="p"/>
-                      </m:rPr>
-                      <a:rPr lang="en-US" b="0" i="0" smtClean="0">
-                        <a:latin typeface="Cambria Math" panose="02040503050406030204" pitchFamily="18" charset="0"/>
-                      </a:rPr>
-                      <m:t>Σ</m:t>
-                    </m:r>
-                    <m:r>
-                      <a:rPr lang="en-US" b="0" i="1" smtClean="0">
-                        <a:latin typeface="Cambria Math" panose="02040503050406030204" pitchFamily="18" charset="0"/>
-                      </a:rPr>
-                      <m:t>𝑥</m:t>
-                    </m:r>
-                  </m:oMath>
+                  <m:oMathPara xmlns:m="http://schemas.openxmlformats.org/officeDocument/2006/math">
+                    <m:oMathParaPr>
+                      <m:jc m:val="centerGroup"/>
+                    </m:oMathParaPr>
+                    <m:oMath xmlns:m="http://schemas.openxmlformats.org/officeDocument/2006/math">
+                      <m:d>
+                        <m:dPr>
+                          <m:ctrlPr>
+                            <a:rPr lang="en-US" b="0" i="1" smtClean="0">
+                              <a:latin typeface="Cambria Math" panose="02040503050406030204" pitchFamily="18" charset="0"/>
+                            </a:rPr>
+                          </m:ctrlPr>
+                        </m:dPr>
+                        <m:e>
+                          <m:func>
+                            <m:funcPr>
+                              <m:ctrlPr>
+                                <a:rPr lang="en-US" b="0" i="1" smtClean="0">
+                                  <a:latin typeface="Cambria Math" panose="02040503050406030204" pitchFamily="18" charset="0"/>
+                                </a:rPr>
+                              </m:ctrlPr>
+                            </m:funcPr>
+                            <m:fName>
+                              <m:limLow>
+                                <m:limLowPr>
+                                  <m:ctrlPr>
+                                    <a:rPr lang="en-US" b="0" i="1" smtClean="0">
+                                      <a:latin typeface="Cambria Math" panose="02040503050406030204" pitchFamily="18" charset="0"/>
+                                    </a:rPr>
+                                  </m:ctrlPr>
+                                </m:limLowPr>
+                                <m:e>
+                                  <m:r>
+                                    <m:rPr>
+                                      <m:sty m:val="p"/>
+                                    </m:rPr>
+                                    <a:rPr lang="en-US" b="0" i="0" smtClean="0">
+                                      <a:latin typeface="Cambria Math" panose="02040503050406030204" pitchFamily="18" charset="0"/>
+                                    </a:rPr>
+                                    <m:t>min</m:t>
+                                  </m:r>
+                                </m:e>
+                                <m:lim>
+                                  <m:r>
+                                    <a:rPr lang="en-US" b="0" i="1" smtClean="0">
+                                      <a:latin typeface="Cambria Math" panose="02040503050406030204" pitchFamily="18" charset="0"/>
+                                    </a:rPr>
+                                    <m:t>𝑖</m:t>
+                                  </m:r>
+                                </m:lim>
+                              </m:limLow>
+                            </m:fName>
+                            <m:e>
+                              <m:sSub>
+                                <m:sSubPr>
+                                  <m:ctrlPr>
+                                    <a:rPr lang="en-US" b="0" i="1" dirty="0" smtClean="0">
+                                      <a:latin typeface="Cambria Math" panose="02040503050406030204" pitchFamily="18" charset="0"/>
+                                    </a:rPr>
+                                  </m:ctrlPr>
+                                </m:sSubPr>
+                                <m:e>
+                                  <m:acc>
+                                    <m:accPr>
+                                      <m:chr m:val="̂"/>
+                                      <m:ctrlPr>
+                                        <a:rPr lang="en-US" b="0" i="1" smtClean="0">
+                                          <a:latin typeface="Cambria Math" panose="02040503050406030204" pitchFamily="18" charset="0"/>
+                                        </a:rPr>
+                                      </m:ctrlPr>
+                                    </m:accPr>
+                                    <m:e>
+                                      <m:r>
+                                        <a:rPr lang="en-US" b="0" i="1" smtClean="0">
+                                          <a:latin typeface="Cambria Math" panose="02040503050406030204" pitchFamily="18" charset="0"/>
+                                        </a:rPr>
+                                        <m:t>𝜇</m:t>
+                                      </m:r>
+                                    </m:e>
+                                  </m:acc>
+                                </m:e>
+                                <m:sub>
+                                  <m:r>
+                                    <a:rPr lang="en-US" b="0" i="1" dirty="0" smtClean="0">
+                                      <a:latin typeface="Cambria Math" panose="02040503050406030204" pitchFamily="18" charset="0"/>
+                                    </a:rPr>
+                                    <m:t>𝑖</m:t>
+                                  </m:r>
+                                </m:sub>
+                              </m:sSub>
+                            </m:e>
+                          </m:func>
+                          <m:r>
+                            <a:rPr lang="en-US" b="0" i="1" smtClean="0">
+                              <a:latin typeface="Cambria Math" panose="02040503050406030204" pitchFamily="18" charset="0"/>
+                            </a:rPr>
+                            <m:t>, </m:t>
+                          </m:r>
+                          <m:func>
+                            <m:funcPr>
+                              <m:ctrlPr>
+                                <a:rPr lang="en-US" b="0" i="1" smtClean="0">
+                                  <a:latin typeface="Cambria Math" panose="02040503050406030204" pitchFamily="18" charset="0"/>
+                                </a:rPr>
+                              </m:ctrlPr>
+                            </m:funcPr>
+                            <m:fName>
+                              <m:limLow>
+                                <m:limLowPr>
+                                  <m:ctrlPr>
+                                    <a:rPr lang="en-US" b="0" i="1" smtClean="0">
+                                      <a:latin typeface="Cambria Math" panose="02040503050406030204" pitchFamily="18" charset="0"/>
+                                    </a:rPr>
+                                  </m:ctrlPr>
+                                </m:limLowPr>
+                                <m:e>
+                                  <m:r>
+                                    <m:rPr>
+                                      <m:sty m:val="p"/>
+                                    </m:rPr>
+                                    <a:rPr lang="en-US" b="0" i="0" smtClean="0">
+                                      <a:latin typeface="Cambria Math" panose="02040503050406030204" pitchFamily="18" charset="0"/>
+                                    </a:rPr>
+                                    <m:t>max</m:t>
+                                  </m:r>
+                                </m:e>
+                                <m:lim>
+                                  <m:r>
+                                    <a:rPr lang="en-US" b="0" i="1" smtClean="0">
+                                      <a:latin typeface="Cambria Math" panose="02040503050406030204" pitchFamily="18" charset="0"/>
+                                    </a:rPr>
+                                    <m:t>𝑖</m:t>
+                                  </m:r>
+                                </m:lim>
+                              </m:limLow>
+                            </m:fName>
+                            <m:e>
+                              <m:sSub>
+                                <m:sSubPr>
+                                  <m:ctrlPr>
+                                    <a:rPr lang="en-US" b="0" i="1" dirty="0" smtClean="0">
+                                      <a:latin typeface="Cambria Math" panose="02040503050406030204" pitchFamily="18" charset="0"/>
+                                    </a:rPr>
+                                  </m:ctrlPr>
+                                </m:sSubPr>
+                                <m:e>
+                                  <m:acc>
+                                    <m:accPr>
+                                      <m:chr m:val="̂"/>
+                                      <m:ctrlPr>
+                                        <a:rPr lang="en-US" b="0" i="1" smtClean="0">
+                                          <a:latin typeface="Cambria Math" panose="02040503050406030204" pitchFamily="18" charset="0"/>
+                                        </a:rPr>
+                                      </m:ctrlPr>
+                                    </m:accPr>
+                                    <m:e>
+                                      <m:r>
+                                        <a:rPr lang="en-US" b="0" i="1" smtClean="0">
+                                          <a:latin typeface="Cambria Math" panose="02040503050406030204" pitchFamily="18" charset="0"/>
+                                        </a:rPr>
+                                        <m:t>𝜇</m:t>
+                                      </m:r>
+                                    </m:e>
+                                  </m:acc>
+                                </m:e>
+                                <m:sub>
+                                  <m:r>
+                                    <a:rPr lang="en-US" b="0" i="1" dirty="0" smtClean="0">
+                                      <a:latin typeface="Cambria Math" panose="02040503050406030204" pitchFamily="18" charset="0"/>
+                                    </a:rPr>
+                                    <m:t>𝑖</m:t>
+                                  </m:r>
+                                </m:sub>
+                              </m:sSub>
+                            </m:e>
+                          </m:func>
+                        </m:e>
+                      </m:d>
+                      <m:r>
+                        <a:rPr lang="en-US" b="0" i="1" smtClean="0">
+                          <a:latin typeface="Cambria Math" panose="02040503050406030204" pitchFamily="18" charset="0"/>
+                        </a:rPr>
+                        <m:t>.</m:t>
+                      </m:r>
+                    </m:oMath>
+                  </m:oMathPara>
                 </a14:m>
                 <a:endParaRPr lang="en-US" dirty="0"/>
               </a:p>
               <a:p>
-                <a:pPr lvl="1"/>
                 <a:r>
                   <a:rPr lang="en-US" dirty="0"/>
-                  <a:t>	        subject to </a:t>
-                </a:r>
-                <a14:m>
-                  <m:oMath xmlns:m="http://schemas.openxmlformats.org/officeDocument/2006/math">
-                    <m:sSup>
-                      <m:sSupPr>
-                        <m:ctrlPr>
-                          <a:rPr lang="en-US" b="0" i="1" smtClean="0">
-                            <a:latin typeface="Cambria Math" panose="02040503050406030204" pitchFamily="18" charset="0"/>
-                          </a:rPr>
-                        </m:ctrlPr>
-                      </m:sSupPr>
-                      <m:e>
-                        <m:r>
-                          <a:rPr lang="en-US" b="0" i="1" smtClean="0">
-                            <a:latin typeface="Cambria Math" panose="02040503050406030204" pitchFamily="18" charset="0"/>
-                          </a:rPr>
-                          <m:t>𝜇</m:t>
-                        </m:r>
-                      </m:e>
-                      <m:sup>
-                        <m:r>
-                          <a:rPr lang="en-US" b="0" i="1" smtClean="0">
-                            <a:latin typeface="Cambria Math" panose="02040503050406030204" pitchFamily="18" charset="0"/>
-                          </a:rPr>
-                          <m:t>𝑇</m:t>
-                        </m:r>
-                      </m:sup>
-                    </m:sSup>
-                    <m:r>
-                      <a:rPr lang="en-US" b="0" i="1" smtClean="0">
-                        <a:latin typeface="Cambria Math" panose="02040503050406030204" pitchFamily="18" charset="0"/>
-                      </a:rPr>
-                      <m:t>𝑥</m:t>
-                    </m:r>
-                    <m:r>
-                      <a:rPr lang="en-US" b="0" i="1" smtClean="0">
-                        <a:latin typeface="Cambria Math" panose="02040503050406030204" pitchFamily="18" charset="0"/>
-                      </a:rPr>
-                      <m:t>+</m:t>
-                    </m:r>
-                    <m:sSub>
-                      <m:sSubPr>
-                        <m:ctrlPr>
-                          <a:rPr lang="en-US" b="0" i="1" smtClean="0">
-                            <a:latin typeface="Cambria Math" panose="02040503050406030204" pitchFamily="18" charset="0"/>
-                          </a:rPr>
-                        </m:ctrlPr>
-                      </m:sSubPr>
-                      <m:e>
-                        <m:r>
-                          <a:rPr lang="en-US" b="0" i="1" smtClean="0">
-                            <a:latin typeface="Cambria Math" panose="02040503050406030204" pitchFamily="18" charset="0"/>
-                          </a:rPr>
-                          <m:t>𝑟</m:t>
-                        </m:r>
-                      </m:e>
-                      <m:sub>
-                        <m:r>
-                          <a:rPr lang="en-US" b="0" i="1" smtClean="0">
-                            <a:latin typeface="Cambria Math" panose="02040503050406030204" pitchFamily="18" charset="0"/>
-                          </a:rPr>
-                          <m:t>𝑓</m:t>
-                        </m:r>
-                      </m:sub>
-                    </m:sSub>
-                    <m:sSub>
-                      <m:sSubPr>
-                        <m:ctrlPr>
-                          <a:rPr lang="en-US" b="0" i="1" smtClean="0">
-                            <a:latin typeface="Cambria Math" panose="02040503050406030204" pitchFamily="18" charset="0"/>
-                          </a:rPr>
-                        </m:ctrlPr>
-                      </m:sSubPr>
-                      <m:e>
-                        <m:r>
-                          <a:rPr lang="en-US" b="0" i="1" smtClean="0">
-                            <a:latin typeface="Cambria Math" panose="02040503050406030204" pitchFamily="18" charset="0"/>
-                          </a:rPr>
-                          <m:t>𝑥</m:t>
-                        </m:r>
-                      </m:e>
-                      <m:sub>
-                        <m:r>
-                          <a:rPr lang="en-US" b="0" i="1" smtClean="0">
-                            <a:latin typeface="Cambria Math" panose="02040503050406030204" pitchFamily="18" charset="0"/>
-                          </a:rPr>
-                          <m:t>𝑐𝑎𝑠h</m:t>
-                        </m:r>
-                      </m:sub>
-                    </m:sSub>
-                    <m:r>
-                      <a:rPr lang="en-US" b="0" i="0" smtClean="0">
-                        <a:latin typeface="Cambria Math" panose="02040503050406030204" pitchFamily="18" charset="0"/>
-                      </a:rPr>
-                      <m:t>=</m:t>
-                    </m:r>
-                    <m:r>
-                      <m:rPr>
-                        <m:sty m:val="p"/>
-                      </m:rPr>
-                      <a:rPr lang="en-US" b="0" i="0" smtClean="0">
-                        <a:latin typeface="Cambria Math" panose="02040503050406030204" pitchFamily="18" charset="0"/>
-                      </a:rPr>
-                      <m:t>R</m:t>
-                    </m:r>
-                  </m:oMath>
-                </a14:m>
-                <a:endParaRPr lang="en-US" dirty="0"/>
-              </a:p>
-              <a:p>
-                <a:pPr lvl="1"/>
-                <a:r>
-                  <a:rPr lang="en-US" b="0" dirty="0"/>
-                  <a:t>                                        </a:t>
-                </a:r>
-                <a14:m>
-                  <m:oMath xmlns:m="http://schemas.openxmlformats.org/officeDocument/2006/math">
-                    <m:nary>
-                      <m:naryPr>
-                        <m:chr m:val="∑"/>
-                        <m:limLoc m:val="subSup"/>
-                        <m:ctrlPr>
-                          <a:rPr lang="en-US" b="0" i="1" smtClean="0">
-                            <a:latin typeface="Cambria Math" panose="02040503050406030204" pitchFamily="18" charset="0"/>
-                          </a:rPr>
-                        </m:ctrlPr>
-                      </m:naryPr>
-                      <m:sub>
-                        <m:r>
-                          <m:rPr>
-                            <m:brk m:alnAt="25"/>
-                          </m:rPr>
-                          <a:rPr lang="en-US" b="0" i="1" smtClean="0">
-                            <a:latin typeface="Cambria Math" panose="02040503050406030204" pitchFamily="18" charset="0"/>
-                          </a:rPr>
-                          <m:t>𝑖</m:t>
-                        </m:r>
-                        <m:r>
-                          <a:rPr lang="en-US" b="0" i="1" smtClean="0">
-                            <a:latin typeface="Cambria Math" panose="02040503050406030204" pitchFamily="18" charset="0"/>
-                          </a:rPr>
-                          <m:t>=1</m:t>
-                        </m:r>
-                      </m:sub>
-                      <m:sup>
-                        <m:r>
-                          <a:rPr lang="en-US" b="0" i="1" smtClean="0">
-                            <a:latin typeface="Cambria Math" panose="02040503050406030204" pitchFamily="18" charset="0"/>
-                          </a:rPr>
-                          <m:t>𝑛</m:t>
-                        </m:r>
-                      </m:sup>
-                      <m:e>
-                        <m:sSub>
-                          <m:sSubPr>
-                            <m:ctrlPr>
-                              <a:rPr lang="en-US" b="0" i="1" smtClean="0">
-                                <a:latin typeface="Cambria Math" panose="02040503050406030204" pitchFamily="18" charset="0"/>
-                              </a:rPr>
-                            </m:ctrlPr>
-                          </m:sSubPr>
-                          <m:e>
-                            <m:r>
-                              <a:rPr lang="en-US" b="0" i="1" smtClean="0">
-                                <a:latin typeface="Cambria Math" panose="02040503050406030204" pitchFamily="18" charset="0"/>
-                              </a:rPr>
-                              <m:t>𝑥</m:t>
-                            </m:r>
-                          </m:e>
-                          <m:sub>
-                            <m:r>
-                              <a:rPr lang="en-US" b="0" i="1" smtClean="0">
-                                <a:latin typeface="Cambria Math" panose="02040503050406030204" pitchFamily="18" charset="0"/>
-                              </a:rPr>
-                              <m:t>𝑖</m:t>
-                            </m:r>
-                          </m:sub>
-                        </m:sSub>
-                        <m:r>
-                          <a:rPr lang="en-US" b="0" i="1" smtClean="0">
-                            <a:latin typeface="Cambria Math" panose="02040503050406030204" pitchFamily="18" charset="0"/>
-                          </a:rPr>
-                          <m:t>+</m:t>
-                        </m:r>
-                        <m:sSub>
-                          <m:sSubPr>
-                            <m:ctrlPr>
-                              <a:rPr lang="en-US" b="0" i="1" smtClean="0">
-                                <a:latin typeface="Cambria Math" panose="02040503050406030204" pitchFamily="18" charset="0"/>
-                              </a:rPr>
-                            </m:ctrlPr>
-                          </m:sSubPr>
-                          <m:e>
-                            <m:r>
-                              <a:rPr lang="en-US" b="0" i="1" smtClean="0">
-                                <a:latin typeface="Cambria Math" panose="02040503050406030204" pitchFamily="18" charset="0"/>
-                              </a:rPr>
-                              <m:t>𝑥</m:t>
-                            </m:r>
-                          </m:e>
-                          <m:sub>
-                            <m:r>
-                              <a:rPr lang="en-US" b="0" i="1" smtClean="0">
-                                <a:latin typeface="Cambria Math" panose="02040503050406030204" pitchFamily="18" charset="0"/>
-                              </a:rPr>
-                              <m:t>𝑐𝑎𝑠h</m:t>
-                            </m:r>
-                          </m:sub>
-                        </m:sSub>
-                        <m:r>
-                          <a:rPr lang="en-US" b="0" i="1" smtClean="0">
-                            <a:latin typeface="Cambria Math" panose="02040503050406030204" pitchFamily="18" charset="0"/>
-                          </a:rPr>
-                          <m:t>=1</m:t>
-                        </m:r>
-                      </m:e>
-                    </m:nary>
-                  </m:oMath>
-                </a14:m>
-                <a:endParaRPr lang="en-US" dirty="0"/>
-              </a:p>
-              <a:p>
-                <a:pPr lvl="1"/>
-                <a:r>
-                  <a:rPr lang="en-US" dirty="0"/>
-                  <a:t>                	          </a:t>
-                </a:r>
-                <a14:m>
-                  <m:oMath xmlns:m="http://schemas.openxmlformats.org/officeDocument/2006/math">
-                    <m:r>
-                      <a:rPr lang="en-US" b="0" i="1" smtClean="0">
-                        <a:latin typeface="Cambria Math" panose="02040503050406030204" pitchFamily="18" charset="0"/>
-                      </a:rPr>
-                      <m:t>𝑥</m:t>
-                    </m:r>
-                    <m:r>
-                      <a:rPr lang="en-US" b="0" i="1" smtClean="0">
-                        <a:latin typeface="Cambria Math" panose="02040503050406030204" pitchFamily="18" charset="0"/>
-                      </a:rPr>
-                      <m:t>, </m:t>
-                    </m:r>
-                    <m:sSub>
-                      <m:sSubPr>
-                        <m:ctrlPr>
-                          <a:rPr lang="en-US" b="0" i="1" smtClean="0">
-                            <a:latin typeface="Cambria Math" panose="02040503050406030204" pitchFamily="18" charset="0"/>
-                          </a:rPr>
-                        </m:ctrlPr>
-                      </m:sSubPr>
-                      <m:e>
-                        <m:r>
-                          <a:rPr lang="en-US" b="0" i="1" smtClean="0">
-                            <a:latin typeface="Cambria Math" panose="02040503050406030204" pitchFamily="18" charset="0"/>
-                          </a:rPr>
-                          <m:t>𝑥</m:t>
-                        </m:r>
-                      </m:e>
-                      <m:sub>
-                        <m:r>
-                          <a:rPr lang="en-US" b="0" i="1" smtClean="0">
-                            <a:latin typeface="Cambria Math" panose="02040503050406030204" pitchFamily="18" charset="0"/>
-                          </a:rPr>
-                          <m:t>𝑐𝑎𝑠h</m:t>
-                        </m:r>
-                      </m:sub>
-                    </m:sSub>
-                    <m:r>
-                      <a:rPr lang="en-US" b="0" i="1" smtClean="0">
-                        <a:latin typeface="Cambria Math" panose="02040503050406030204" pitchFamily="18" charset="0"/>
-                      </a:rPr>
-                      <m:t>≥0</m:t>
-                    </m:r>
-                  </m:oMath>
-                </a14:m>
-                <a:endParaRPr lang="en-US" dirty="0"/>
-              </a:p>
-              <a:p>
-                <a:pPr marL="742950" lvl="1" indent="-285750">
-                  <a:buFont typeface="Arial" panose="020B0604020202020204" pitchFamily="34" charset="0"/>
-                  <a:buChar char="•"/>
-                </a:pPr>
-                <a:r>
-                  <a:rPr lang="en-US" dirty="0"/>
-                  <a:t>and addition of </a:t>
-                </a:r>
-                <a14:m>
-                  <m:oMath xmlns:m="http://schemas.openxmlformats.org/officeDocument/2006/math">
-                    <m:sSub>
-                      <m:sSubPr>
-                        <m:ctrlPr>
-                          <a:rPr lang="en-US" b="0" i="1" smtClean="0">
-                            <a:latin typeface="Cambria Math" panose="02040503050406030204" pitchFamily="18" charset="0"/>
-                          </a:rPr>
-                        </m:ctrlPr>
-                      </m:sSubPr>
-                      <m:e>
-                        <m:r>
-                          <a:rPr lang="en-US" b="0" i="1" smtClean="0">
-                            <a:latin typeface="Cambria Math" panose="02040503050406030204" pitchFamily="18" charset="0"/>
-                          </a:rPr>
-                          <m:t>ℓ</m:t>
-                        </m:r>
-                      </m:e>
-                      <m:sub>
-                        <m:r>
-                          <a:rPr lang="en-US" b="0" i="1" smtClean="0">
-                            <a:latin typeface="Cambria Math" panose="02040503050406030204" pitchFamily="18" charset="0"/>
-                          </a:rPr>
-                          <m:t>1</m:t>
-                        </m:r>
-                      </m:sub>
-                    </m:sSub>
-                  </m:oMath>
-                </a14:m>
-                <a:r>
-                  <a:rPr lang="en-US" dirty="0"/>
-                  <a:t> and </a:t>
-                </a:r>
-                <a14:m>
-                  <m:oMath xmlns:m="http://schemas.openxmlformats.org/officeDocument/2006/math">
-                    <m:sSub>
-                      <m:sSubPr>
-                        <m:ctrlPr>
-                          <a:rPr lang="en-US" b="0" i="1" smtClean="0">
-                            <a:latin typeface="Cambria Math" panose="02040503050406030204" pitchFamily="18" charset="0"/>
-                          </a:rPr>
-                        </m:ctrlPr>
-                      </m:sSubPr>
-                      <m:e>
-                        <m:r>
-                          <a:rPr lang="en-US" b="0" i="1" smtClean="0">
-                            <a:latin typeface="Cambria Math" panose="02040503050406030204" pitchFamily="18" charset="0"/>
-                          </a:rPr>
-                          <m:t>ℓ</m:t>
-                        </m:r>
-                      </m:e>
-                      <m:sub>
-                        <m:r>
-                          <a:rPr lang="en-US" b="0" i="1" smtClean="0">
-                            <a:latin typeface="Cambria Math" panose="02040503050406030204" pitchFamily="18" charset="0"/>
-                          </a:rPr>
-                          <m:t>2</m:t>
-                        </m:r>
-                      </m:sub>
-                    </m:sSub>
-                  </m:oMath>
-                </a14:m>
-                <a:r>
-                  <a:rPr lang="en-US" dirty="0"/>
-                  <a:t> penalty terms:</a:t>
+                  <a:t>       Hence, we restrict our new model to this </a:t>
                 </a:r>
               </a:p>
               <a:p>
-                <a:pPr marL="1200150" lvl="2" indent="-285750">
-                  <a:buFont typeface="Arial" panose="020B0604020202020204" pitchFamily="34" charset="0"/>
-                  <a:buChar char="•"/>
-                </a:pPr>
                 <a:r>
                   <a:rPr lang="en-US" dirty="0"/>
-                  <a:t>minimize </a:t>
+                  <a:t>       interval.</a:t>
                 </a:r>
-                <a14:m>
-                  <m:oMath xmlns:m="http://schemas.openxmlformats.org/officeDocument/2006/math">
-                    <m:sSup>
-                      <m:sSupPr>
-                        <m:ctrlPr>
-                          <a:rPr lang="en-US" b="0" i="1" smtClean="0">
-                            <a:latin typeface="Cambria Math" panose="02040503050406030204" pitchFamily="18" charset="0"/>
-                          </a:rPr>
-                        </m:ctrlPr>
-                      </m:sSupPr>
-                      <m:e>
-                        <m:r>
-                          <a:rPr lang="en-US" b="0" i="1" smtClean="0">
-                            <a:latin typeface="Cambria Math" panose="02040503050406030204" pitchFamily="18" charset="0"/>
-                          </a:rPr>
-                          <m:t>𝑥</m:t>
-                        </m:r>
-                      </m:e>
-                      <m:sup>
-                        <m:r>
-                          <a:rPr lang="en-US" b="0" i="1" smtClean="0">
-                            <a:latin typeface="Cambria Math" panose="02040503050406030204" pitchFamily="18" charset="0"/>
-                          </a:rPr>
-                          <m:t>𝑇</m:t>
-                        </m:r>
-                      </m:sup>
-                    </m:sSup>
-                    <m:r>
-                      <m:rPr>
-                        <m:sty m:val="p"/>
-                      </m:rPr>
-                      <a:rPr lang="en-US" b="0" i="0" smtClean="0">
-                        <a:latin typeface="Cambria Math" panose="02040503050406030204" pitchFamily="18" charset="0"/>
-                      </a:rPr>
-                      <m:t>Σx</m:t>
-                    </m:r>
-                    <m:r>
-                      <a:rPr lang="en-US" b="0" i="0" smtClean="0">
-                        <a:latin typeface="Cambria Math" panose="02040503050406030204" pitchFamily="18" charset="0"/>
-                      </a:rPr>
-                      <m:t>+</m:t>
-                    </m:r>
-                    <m:r>
-                      <a:rPr lang="en-US" b="0" i="1" smtClean="0">
-                        <a:latin typeface="Cambria Math" panose="02040503050406030204" pitchFamily="18" charset="0"/>
-                      </a:rPr>
-                      <m:t>𝛾</m:t>
-                    </m:r>
-                    <m:sSub>
-                      <m:sSubPr>
-                        <m:ctrlPr>
-                          <a:rPr lang="en-US" b="0" i="1" smtClean="0">
-                            <a:latin typeface="Cambria Math" panose="02040503050406030204" pitchFamily="18" charset="0"/>
-                          </a:rPr>
-                        </m:ctrlPr>
-                      </m:sSubPr>
-                      <m:e>
-                        <m:d>
-                          <m:dPr>
-                            <m:begChr m:val="|"/>
-                            <m:endChr m:val="|"/>
-                            <m:ctrlPr>
-                              <a:rPr lang="en-US" b="0" i="1" smtClean="0">
-                                <a:latin typeface="Cambria Math" panose="02040503050406030204" pitchFamily="18" charset="0"/>
-                              </a:rPr>
-                            </m:ctrlPr>
-                          </m:dPr>
-                          <m:e>
-                            <m:d>
-                              <m:dPr>
-                                <m:begChr m:val="|"/>
-                                <m:endChr m:val="|"/>
-                                <m:ctrlPr>
-                                  <a:rPr lang="en-US" b="0" i="1" smtClean="0">
-                                    <a:latin typeface="Cambria Math" panose="02040503050406030204" pitchFamily="18" charset="0"/>
-                                  </a:rPr>
-                                </m:ctrlPr>
-                              </m:dPr>
-                              <m:e>
-                                <m:r>
-                                  <a:rPr lang="en-US" b="0" i="1" smtClean="0">
-                                    <a:latin typeface="Cambria Math" panose="02040503050406030204" pitchFamily="18" charset="0"/>
-                                  </a:rPr>
-                                  <m:t>𝑥</m:t>
-                                </m:r>
-                              </m:e>
-                            </m:d>
-                          </m:e>
-                        </m:d>
-                      </m:e>
-                      <m:sub>
-                        <m:r>
-                          <a:rPr lang="en-US" b="0" i="1" smtClean="0">
-                            <a:latin typeface="Cambria Math" panose="02040503050406030204" pitchFamily="18" charset="0"/>
-                          </a:rPr>
-                          <m:t>1</m:t>
-                        </m:r>
-                      </m:sub>
-                    </m:sSub>
-                  </m:oMath>
-                </a14:m>
-                <a:endParaRPr lang="en-US" dirty="0"/>
-              </a:p>
-              <a:p>
-                <a:pPr marL="1200150" lvl="2" indent="-285750">
-                  <a:buFont typeface="Arial" panose="020B0604020202020204" pitchFamily="34" charset="0"/>
-                  <a:buChar char="•"/>
-                </a:pPr>
-                <a:r>
-                  <a:rPr lang="en-US" dirty="0"/>
-                  <a:t>minimize </a:t>
-                </a:r>
-                <a14:m>
-                  <m:oMath xmlns:m="http://schemas.openxmlformats.org/officeDocument/2006/math">
-                    <m:sSup>
-                      <m:sSupPr>
-                        <m:ctrlPr>
-                          <a:rPr lang="en-US" b="0" i="1" smtClean="0">
-                            <a:latin typeface="Cambria Math" panose="02040503050406030204" pitchFamily="18" charset="0"/>
-                          </a:rPr>
-                        </m:ctrlPr>
-                      </m:sSupPr>
-                      <m:e>
-                        <m:r>
-                          <a:rPr lang="en-US" b="0" i="1" smtClean="0">
-                            <a:latin typeface="Cambria Math" panose="02040503050406030204" pitchFamily="18" charset="0"/>
-                          </a:rPr>
-                          <m:t>𝑥</m:t>
-                        </m:r>
-                      </m:e>
-                      <m:sup>
-                        <m:r>
-                          <a:rPr lang="en-US" b="0" i="1" smtClean="0">
-                            <a:latin typeface="Cambria Math" panose="02040503050406030204" pitchFamily="18" charset="0"/>
-                          </a:rPr>
-                          <m:t>𝑇</m:t>
-                        </m:r>
-                      </m:sup>
-                    </m:sSup>
-                    <m:r>
-                      <m:rPr>
-                        <m:sty m:val="p"/>
-                      </m:rPr>
-                      <a:rPr lang="en-US" b="0" i="0" smtClean="0">
-                        <a:latin typeface="Cambria Math" panose="02040503050406030204" pitchFamily="18" charset="0"/>
-                      </a:rPr>
-                      <m:t>Σx</m:t>
-                    </m:r>
-                    <m:r>
-                      <a:rPr lang="en-US" b="0" i="0" smtClean="0">
-                        <a:latin typeface="Cambria Math" panose="02040503050406030204" pitchFamily="18" charset="0"/>
-                      </a:rPr>
-                      <m:t>+</m:t>
-                    </m:r>
-                    <m:r>
-                      <a:rPr lang="en-US" b="0" i="1" smtClean="0">
-                        <a:latin typeface="Cambria Math" panose="02040503050406030204" pitchFamily="18" charset="0"/>
-                      </a:rPr>
-                      <m:t>𝛾</m:t>
-                    </m:r>
-                    <m:sSubSup>
-                      <m:sSubSupPr>
-                        <m:ctrlPr>
-                          <a:rPr lang="en-US" b="0" i="1" smtClean="0">
-                            <a:latin typeface="Cambria Math" panose="02040503050406030204" pitchFamily="18" charset="0"/>
-                          </a:rPr>
-                        </m:ctrlPr>
-                      </m:sSubSupPr>
-                      <m:e>
-                        <m:d>
-                          <m:dPr>
-                            <m:begChr m:val="|"/>
-                            <m:endChr m:val="|"/>
-                            <m:ctrlPr>
-                              <a:rPr lang="en-US" b="0" i="1" smtClean="0">
-                                <a:latin typeface="Cambria Math" panose="02040503050406030204" pitchFamily="18" charset="0"/>
-                              </a:rPr>
-                            </m:ctrlPr>
-                          </m:dPr>
-                          <m:e>
-                            <m:d>
-                              <m:dPr>
-                                <m:begChr m:val="|"/>
-                                <m:endChr m:val="|"/>
-                                <m:ctrlPr>
-                                  <a:rPr lang="en-US" b="0" i="1" smtClean="0">
-                                    <a:latin typeface="Cambria Math" panose="02040503050406030204" pitchFamily="18" charset="0"/>
-                                  </a:rPr>
-                                </m:ctrlPr>
-                              </m:dPr>
-                              <m:e>
-                                <m:r>
-                                  <a:rPr lang="en-US" b="0" i="1" smtClean="0">
-                                    <a:latin typeface="Cambria Math" panose="02040503050406030204" pitchFamily="18" charset="0"/>
-                                  </a:rPr>
-                                  <m:t>𝑥</m:t>
-                                </m:r>
-                              </m:e>
-                            </m:d>
-                          </m:e>
-                        </m:d>
-                      </m:e>
-                      <m:sub>
-                        <m:r>
-                          <a:rPr lang="en-US" b="0" i="1" smtClean="0">
-                            <a:latin typeface="Cambria Math" panose="02040503050406030204" pitchFamily="18" charset="0"/>
-                          </a:rPr>
-                          <m:t>2</m:t>
-                        </m:r>
-                      </m:sub>
-                      <m:sup>
-                        <m:r>
-                          <a:rPr lang="en-US" b="0" i="1" smtClean="0">
-                            <a:latin typeface="Cambria Math" panose="02040503050406030204" pitchFamily="18" charset="0"/>
-                          </a:rPr>
-                          <m:t>2</m:t>
-                        </m:r>
-                      </m:sup>
-                    </m:sSubSup>
-                  </m:oMath>
-                </a14:m>
-                <a:endParaRPr lang="en-US" dirty="0"/>
-              </a:p>
-              <a:p>
-                <a:pPr marL="1200150" lvl="2" indent="-285750">
-                  <a:buFont typeface="Arial" panose="020B0604020202020204" pitchFamily="34" charset="0"/>
-                  <a:buChar char="•"/>
-                </a:pPr>
-                <a:endParaRPr lang="en-US" dirty="0"/>
               </a:p>
             </p:txBody>
           </p:sp>
@@ -6259,10 +6257,10 @@
         <mc:Fallback>
           <p:sp>
             <p:nvSpPr>
-              <p:cNvPr id="7" name="TextBox 6">
+              <p:cNvPr id="8" name="TextBox 7">
                 <a:extLst>
                   <a:ext uri="{FF2B5EF4-FFF2-40B4-BE49-F238E27FC236}">
-                    <a16:creationId xmlns:a16="http://schemas.microsoft.com/office/drawing/2014/main" id="{E543C580-8BEB-2F8A-57BD-0EFA589E8917}"/>
+                    <a16:creationId xmlns:a16="http://schemas.microsoft.com/office/drawing/2014/main" id="{8770405C-0394-2E82-6348-0B3B46D85371}"/>
                   </a:ext>
                 </a:extLst>
               </p:cNvPr>
@@ -6273,8 +6271,8 @@
             </p:nvSpPr>
             <p:spPr>
               <a:xfrm>
-                <a:off x="6434664" y="3293528"/>
-                <a:ext cx="5249333" cy="3643433"/>
+                <a:off x="6460067" y="3287402"/>
+                <a:ext cx="5087499" cy="2741520"/>
               </a:xfrm>
               <a:prstGeom prst="rect">
                 <a:avLst/>
@@ -6282,7 +6280,7 @@
               <a:blipFill>
                 <a:blip r:embed="rId6"/>
                 <a:stretch>
-                  <a:fillRect l="-813" t="-669"/>
+                  <a:fillRect l="-1079" t="-889" r="-1559" b="-2667"/>
                 </a:stretch>
               </a:blipFill>
             </p:spPr>
@@ -6347,7 +6345,12 @@
             <p:ph type="title"/>
           </p:nvPr>
         </p:nvSpPr>
-        <p:spPr/>
+        <p:spPr>
+          <a:xfrm>
+            <a:off x="4270442" y="270905"/>
+            <a:ext cx="7239000" cy="1325563"/>
+          </a:xfrm>
+        </p:spPr>
         <p:txBody>
           <a:bodyPr/>
           <a:lstStyle/>
@@ -6359,34 +6362,988 @@
           </a:p>
         </p:txBody>
       </p:sp>
-      <p:sp>
-        <p:nvSpPr>
-          <p:cNvPr id="3" name="Content Placeholder 2">
+      <p:pic>
+        <p:nvPicPr>
+          <p:cNvPr id="5" name="Picture 4" descr="A graph with a line&#10;&#10;AI-generated content may be incorrect.">
             <a:extLst>
               <a:ext uri="{FF2B5EF4-FFF2-40B4-BE49-F238E27FC236}">
-                <a16:creationId xmlns:a16="http://schemas.microsoft.com/office/drawing/2014/main" id="{30D832B3-0131-FA1A-C95F-5826B537AD21}"/>
+                <a16:creationId xmlns:a16="http://schemas.microsoft.com/office/drawing/2014/main" id="{DC28098C-5B8A-FD20-0EB3-6CE6FB053C1F}"/>
               </a:ext>
             </a:extLst>
           </p:cNvPr>
-          <p:cNvSpPr>
-            <a:spLocks noGrp="1"/>
-          </p:cNvSpPr>
-          <p:nvPr>
-            <p:ph idx="1"/>
-          </p:nvPr>
-        </p:nvSpPr>
-        <p:spPr/>
-        <p:txBody>
-          <a:bodyPr/>
-          <a:lstStyle/>
-          <a:p>
-            <a:r>
-              <a:rPr lang="en-US" dirty="0"/>
-              <a:t>Key take away: Optimization and prediction of financial data requires a much more complex model. </a:t>
-            </a:r>
-          </a:p>
-        </p:txBody>
-      </p:sp>
+          <p:cNvPicPr>
+            <a:picLocks noChangeAspect="1"/>
+          </p:cNvPicPr>
+          <p:nvPr/>
+        </p:nvPicPr>
+        <p:blipFill>
+          <a:blip r:embed="rId3">
+            <a:extLst>
+              <a:ext uri="{28A0092B-C50C-407E-A947-70E740481C1C}">
+                <a14:useLocalDpi xmlns:a14="http://schemas.microsoft.com/office/drawing/2010/main" val="0"/>
+              </a:ext>
+            </a:extLst>
+          </a:blip>
+          <a:stretch>
+            <a:fillRect/>
+          </a:stretch>
+        </p:blipFill>
+        <p:spPr>
+          <a:xfrm>
+            <a:off x="411690" y="397907"/>
+            <a:ext cx="3290309" cy="1742681"/>
+          </a:xfrm>
+          <a:prstGeom prst="rect">
+            <a:avLst/>
+          </a:prstGeom>
+        </p:spPr>
+      </p:pic>
+      <p:pic>
+        <p:nvPicPr>
+          <p:cNvPr id="7" name="Picture 6" descr="A graph with a line&#10;&#10;AI-generated content may be incorrect.">
+            <a:extLst>
+              <a:ext uri="{FF2B5EF4-FFF2-40B4-BE49-F238E27FC236}">
+                <a16:creationId xmlns:a16="http://schemas.microsoft.com/office/drawing/2014/main" id="{72A4649B-4AD2-188B-65C9-09BF971CC767}"/>
+              </a:ext>
+            </a:extLst>
+          </p:cNvPr>
+          <p:cNvPicPr>
+            <a:picLocks noChangeAspect="1"/>
+          </p:cNvPicPr>
+          <p:nvPr/>
+        </p:nvPicPr>
+        <p:blipFill>
+          <a:blip r:embed="rId4">
+            <a:extLst>
+              <a:ext uri="{28A0092B-C50C-407E-A947-70E740481C1C}">
+                <a14:useLocalDpi xmlns:a14="http://schemas.microsoft.com/office/drawing/2010/main" val="0"/>
+              </a:ext>
+            </a:extLst>
+          </a:blip>
+          <a:stretch>
+            <a:fillRect/>
+          </a:stretch>
+        </p:blipFill>
+        <p:spPr>
+          <a:xfrm>
+            <a:off x="411691" y="2541268"/>
+            <a:ext cx="3290309" cy="1775464"/>
+          </a:xfrm>
+          <a:prstGeom prst="rect">
+            <a:avLst/>
+          </a:prstGeom>
+        </p:spPr>
+      </p:pic>
+      <p:pic>
+        <p:nvPicPr>
+          <p:cNvPr id="9" name="Picture 8" descr="A graph of a number of points&#10;&#10;AI-generated content may be incorrect.">
+            <a:extLst>
+              <a:ext uri="{FF2B5EF4-FFF2-40B4-BE49-F238E27FC236}">
+                <a16:creationId xmlns:a16="http://schemas.microsoft.com/office/drawing/2014/main" id="{68ACD899-8362-6742-2F4C-8B6C50457FCD}"/>
+              </a:ext>
+            </a:extLst>
+          </p:cNvPr>
+          <p:cNvPicPr>
+            <a:picLocks noChangeAspect="1"/>
+          </p:cNvPicPr>
+          <p:nvPr/>
+        </p:nvPicPr>
+        <p:blipFill>
+          <a:blip r:embed="rId5">
+            <a:extLst>
+              <a:ext uri="{28A0092B-C50C-407E-A947-70E740481C1C}">
+                <a14:useLocalDpi xmlns:a14="http://schemas.microsoft.com/office/drawing/2010/main" val="0"/>
+              </a:ext>
+            </a:extLst>
+          </a:blip>
+          <a:stretch>
+            <a:fillRect/>
+          </a:stretch>
+        </p:blipFill>
+        <p:spPr>
+          <a:xfrm>
+            <a:off x="411691" y="4717411"/>
+            <a:ext cx="3290309" cy="1775464"/>
+          </a:xfrm>
+          <a:prstGeom prst="rect">
+            <a:avLst/>
+          </a:prstGeom>
+        </p:spPr>
+      </p:pic>
+      <mc:AlternateContent xmlns:mc="http://schemas.openxmlformats.org/markup-compatibility/2006">
+        <mc:Choice xmlns:a14="http://schemas.microsoft.com/office/drawing/2010/main" Requires="a14">
+          <p:sp>
+            <p:nvSpPr>
+              <p:cNvPr id="10" name="TextBox 9">
+                <a:extLst>
+                  <a:ext uri="{FF2B5EF4-FFF2-40B4-BE49-F238E27FC236}">
+                    <a16:creationId xmlns:a16="http://schemas.microsoft.com/office/drawing/2014/main" id="{06C91F09-433D-B0C5-D55A-F602E4733882}"/>
+                  </a:ext>
+                </a:extLst>
+              </p:cNvPr>
+              <p:cNvSpPr txBox="1"/>
+              <p:nvPr/>
+            </p:nvSpPr>
+            <p:spPr>
+              <a:xfrm>
+                <a:off x="4100320" y="1259808"/>
+                <a:ext cx="7409121" cy="5582426"/>
+              </a:xfrm>
+              <a:prstGeom prst="rect">
+                <a:avLst/>
+              </a:prstGeom>
+              <a:noFill/>
+            </p:spPr>
+            <p:txBody>
+              <a:bodyPr wrap="square" rtlCol="0">
+                <a:spAutoFit/>
+              </a:bodyPr>
+              <a:lstStyle/>
+              <a:p>
+                <a:pPr marL="285750" indent="-285750">
+                  <a:buFont typeface="Arial" panose="020B0604020202020204" pitchFamily="34" charset="0"/>
+                  <a:buChar char="•"/>
+                </a:pPr>
+                <a:r>
+                  <a:rPr lang="en-US" dirty="0"/>
+                  <a:t>After solving this problem, we can begin to extend the model to compare results. Our extensions include </a:t>
+                </a:r>
+              </a:p>
+              <a:p>
+                <a:pPr marL="742950" lvl="1" indent="-285750">
+                  <a:buFont typeface="Arial" panose="020B0604020202020204" pitchFamily="34" charset="0"/>
+                  <a:buChar char="•"/>
+                </a:pPr>
+                <a:r>
+                  <a:rPr lang="en-US" dirty="0"/>
+                  <a:t>a risk-free asset model:</a:t>
+                </a:r>
+              </a:p>
+              <a:p>
+                <a:pPr lvl="1"/>
+                <a:r>
+                  <a:rPr lang="en-US" dirty="0"/>
+                  <a:t>	          minimize </a:t>
+                </a:r>
+                <a14:m>
+                  <m:oMath xmlns:m="http://schemas.openxmlformats.org/officeDocument/2006/math">
+                    <m:sSup>
+                      <m:sSupPr>
+                        <m:ctrlPr>
+                          <a:rPr lang="en-US" b="0" i="1" smtClean="0">
+                            <a:latin typeface="Cambria Math" panose="02040503050406030204" pitchFamily="18" charset="0"/>
+                          </a:rPr>
+                        </m:ctrlPr>
+                      </m:sSupPr>
+                      <m:e>
+                        <m:r>
+                          <a:rPr lang="en-US" b="0" i="1" smtClean="0">
+                            <a:latin typeface="Cambria Math" panose="02040503050406030204" pitchFamily="18" charset="0"/>
+                          </a:rPr>
+                          <m:t>𝑥</m:t>
+                        </m:r>
+                      </m:e>
+                      <m:sup>
+                        <m:r>
+                          <a:rPr lang="en-US" b="0" i="1" smtClean="0">
+                            <a:latin typeface="Cambria Math" panose="02040503050406030204" pitchFamily="18" charset="0"/>
+                          </a:rPr>
+                          <m:t>𝑇</m:t>
+                        </m:r>
+                      </m:sup>
+                    </m:sSup>
+                    <m:r>
+                      <m:rPr>
+                        <m:sty m:val="p"/>
+                      </m:rPr>
+                      <a:rPr lang="en-US" b="0" i="0" smtClean="0">
+                        <a:latin typeface="Cambria Math" panose="02040503050406030204" pitchFamily="18" charset="0"/>
+                      </a:rPr>
+                      <m:t>Σ</m:t>
+                    </m:r>
+                    <m:r>
+                      <a:rPr lang="en-US" b="0" i="1" smtClean="0">
+                        <a:latin typeface="Cambria Math" panose="02040503050406030204" pitchFamily="18" charset="0"/>
+                      </a:rPr>
+                      <m:t>𝑥</m:t>
+                    </m:r>
+                  </m:oMath>
+                </a14:m>
+                <a:endParaRPr lang="en-US" dirty="0"/>
+              </a:p>
+              <a:p>
+                <a:pPr lvl="1"/>
+                <a:r>
+                  <a:rPr lang="en-US" dirty="0"/>
+                  <a:t>	        subject to </a:t>
+                </a:r>
+                <a14:m>
+                  <m:oMath xmlns:m="http://schemas.openxmlformats.org/officeDocument/2006/math">
+                    <m:sSup>
+                      <m:sSupPr>
+                        <m:ctrlPr>
+                          <a:rPr lang="en-US" b="0" i="1" smtClean="0">
+                            <a:latin typeface="Cambria Math" panose="02040503050406030204" pitchFamily="18" charset="0"/>
+                          </a:rPr>
+                        </m:ctrlPr>
+                      </m:sSupPr>
+                      <m:e>
+                        <m:r>
+                          <a:rPr lang="en-US" b="0" i="1" smtClean="0">
+                            <a:latin typeface="Cambria Math" panose="02040503050406030204" pitchFamily="18" charset="0"/>
+                          </a:rPr>
+                          <m:t>𝜇</m:t>
+                        </m:r>
+                      </m:e>
+                      <m:sup>
+                        <m:r>
+                          <a:rPr lang="en-US" b="0" i="1" smtClean="0">
+                            <a:latin typeface="Cambria Math" panose="02040503050406030204" pitchFamily="18" charset="0"/>
+                          </a:rPr>
+                          <m:t>𝑇</m:t>
+                        </m:r>
+                      </m:sup>
+                    </m:sSup>
+                    <m:r>
+                      <a:rPr lang="en-US" b="0" i="1" smtClean="0">
+                        <a:latin typeface="Cambria Math" panose="02040503050406030204" pitchFamily="18" charset="0"/>
+                      </a:rPr>
+                      <m:t>𝑥</m:t>
+                    </m:r>
+                    <m:r>
+                      <a:rPr lang="en-US" b="0" i="1" smtClean="0">
+                        <a:latin typeface="Cambria Math" panose="02040503050406030204" pitchFamily="18" charset="0"/>
+                      </a:rPr>
+                      <m:t>+</m:t>
+                    </m:r>
+                    <m:sSub>
+                      <m:sSubPr>
+                        <m:ctrlPr>
+                          <a:rPr lang="en-US" b="0" i="1" smtClean="0">
+                            <a:latin typeface="Cambria Math" panose="02040503050406030204" pitchFamily="18" charset="0"/>
+                          </a:rPr>
+                        </m:ctrlPr>
+                      </m:sSubPr>
+                      <m:e>
+                        <m:r>
+                          <a:rPr lang="en-US" b="0" i="1" smtClean="0">
+                            <a:latin typeface="Cambria Math" panose="02040503050406030204" pitchFamily="18" charset="0"/>
+                          </a:rPr>
+                          <m:t>𝑟</m:t>
+                        </m:r>
+                      </m:e>
+                      <m:sub>
+                        <m:r>
+                          <a:rPr lang="en-US" b="0" i="1" smtClean="0">
+                            <a:latin typeface="Cambria Math" panose="02040503050406030204" pitchFamily="18" charset="0"/>
+                          </a:rPr>
+                          <m:t>𝑓</m:t>
+                        </m:r>
+                      </m:sub>
+                    </m:sSub>
+                    <m:sSub>
+                      <m:sSubPr>
+                        <m:ctrlPr>
+                          <a:rPr lang="en-US" b="0" i="1" smtClean="0">
+                            <a:latin typeface="Cambria Math" panose="02040503050406030204" pitchFamily="18" charset="0"/>
+                          </a:rPr>
+                        </m:ctrlPr>
+                      </m:sSubPr>
+                      <m:e>
+                        <m:r>
+                          <a:rPr lang="en-US" b="0" i="1" smtClean="0">
+                            <a:latin typeface="Cambria Math" panose="02040503050406030204" pitchFamily="18" charset="0"/>
+                          </a:rPr>
+                          <m:t>𝑥</m:t>
+                        </m:r>
+                      </m:e>
+                      <m:sub>
+                        <m:r>
+                          <a:rPr lang="en-US" b="0" i="1" smtClean="0">
+                            <a:latin typeface="Cambria Math" panose="02040503050406030204" pitchFamily="18" charset="0"/>
+                          </a:rPr>
+                          <m:t>𝑐𝑎𝑠h</m:t>
+                        </m:r>
+                      </m:sub>
+                    </m:sSub>
+                    <m:r>
+                      <a:rPr lang="en-US" b="0" i="0" smtClean="0">
+                        <a:latin typeface="Cambria Math" panose="02040503050406030204" pitchFamily="18" charset="0"/>
+                      </a:rPr>
+                      <m:t>=</m:t>
+                    </m:r>
+                    <m:r>
+                      <m:rPr>
+                        <m:sty m:val="p"/>
+                      </m:rPr>
+                      <a:rPr lang="en-US" b="0" i="0" smtClean="0">
+                        <a:latin typeface="Cambria Math" panose="02040503050406030204" pitchFamily="18" charset="0"/>
+                      </a:rPr>
+                      <m:t>R</m:t>
+                    </m:r>
+                  </m:oMath>
+                </a14:m>
+                <a:endParaRPr lang="en-US" dirty="0"/>
+              </a:p>
+              <a:p>
+                <a:pPr lvl="1"/>
+                <a:r>
+                  <a:rPr lang="en-US" b="0" dirty="0"/>
+                  <a:t>                                        </a:t>
+                </a:r>
+                <a14:m>
+                  <m:oMath xmlns:m="http://schemas.openxmlformats.org/officeDocument/2006/math">
+                    <m:nary>
+                      <m:naryPr>
+                        <m:chr m:val="∑"/>
+                        <m:limLoc m:val="subSup"/>
+                        <m:ctrlPr>
+                          <a:rPr lang="en-US" b="0" i="1" smtClean="0">
+                            <a:latin typeface="Cambria Math" panose="02040503050406030204" pitchFamily="18" charset="0"/>
+                          </a:rPr>
+                        </m:ctrlPr>
+                      </m:naryPr>
+                      <m:sub>
+                        <m:r>
+                          <m:rPr>
+                            <m:brk m:alnAt="25"/>
+                          </m:rPr>
+                          <a:rPr lang="en-US" b="0" i="1" smtClean="0">
+                            <a:latin typeface="Cambria Math" panose="02040503050406030204" pitchFamily="18" charset="0"/>
+                          </a:rPr>
+                          <m:t>𝑖</m:t>
+                        </m:r>
+                        <m:r>
+                          <a:rPr lang="en-US" b="0" i="1" smtClean="0">
+                            <a:latin typeface="Cambria Math" panose="02040503050406030204" pitchFamily="18" charset="0"/>
+                          </a:rPr>
+                          <m:t>=1</m:t>
+                        </m:r>
+                      </m:sub>
+                      <m:sup>
+                        <m:r>
+                          <a:rPr lang="en-US" b="0" i="1" smtClean="0">
+                            <a:latin typeface="Cambria Math" panose="02040503050406030204" pitchFamily="18" charset="0"/>
+                          </a:rPr>
+                          <m:t>𝑛</m:t>
+                        </m:r>
+                      </m:sup>
+                      <m:e>
+                        <m:sSub>
+                          <m:sSubPr>
+                            <m:ctrlPr>
+                              <a:rPr lang="en-US" b="0" i="1" smtClean="0">
+                                <a:latin typeface="Cambria Math" panose="02040503050406030204" pitchFamily="18" charset="0"/>
+                              </a:rPr>
+                            </m:ctrlPr>
+                          </m:sSubPr>
+                          <m:e>
+                            <m:r>
+                              <a:rPr lang="en-US" b="0" i="1" smtClean="0">
+                                <a:latin typeface="Cambria Math" panose="02040503050406030204" pitchFamily="18" charset="0"/>
+                              </a:rPr>
+                              <m:t>𝑥</m:t>
+                            </m:r>
+                          </m:e>
+                          <m:sub>
+                            <m:r>
+                              <a:rPr lang="en-US" b="0" i="1" smtClean="0">
+                                <a:latin typeface="Cambria Math" panose="02040503050406030204" pitchFamily="18" charset="0"/>
+                              </a:rPr>
+                              <m:t>𝑖</m:t>
+                            </m:r>
+                          </m:sub>
+                        </m:sSub>
+                        <m:r>
+                          <a:rPr lang="en-US" b="0" i="1" smtClean="0">
+                            <a:latin typeface="Cambria Math" panose="02040503050406030204" pitchFamily="18" charset="0"/>
+                          </a:rPr>
+                          <m:t>+</m:t>
+                        </m:r>
+                        <m:sSub>
+                          <m:sSubPr>
+                            <m:ctrlPr>
+                              <a:rPr lang="en-US" b="0" i="1" smtClean="0">
+                                <a:latin typeface="Cambria Math" panose="02040503050406030204" pitchFamily="18" charset="0"/>
+                              </a:rPr>
+                            </m:ctrlPr>
+                          </m:sSubPr>
+                          <m:e>
+                            <m:r>
+                              <a:rPr lang="en-US" b="0" i="1" smtClean="0">
+                                <a:latin typeface="Cambria Math" panose="02040503050406030204" pitchFamily="18" charset="0"/>
+                              </a:rPr>
+                              <m:t>𝑥</m:t>
+                            </m:r>
+                          </m:e>
+                          <m:sub>
+                            <m:r>
+                              <a:rPr lang="en-US" b="0" i="1" smtClean="0">
+                                <a:latin typeface="Cambria Math" panose="02040503050406030204" pitchFamily="18" charset="0"/>
+                              </a:rPr>
+                              <m:t>𝑐𝑎𝑠h</m:t>
+                            </m:r>
+                          </m:sub>
+                        </m:sSub>
+                        <m:r>
+                          <a:rPr lang="en-US" b="0" i="1" smtClean="0">
+                            <a:latin typeface="Cambria Math" panose="02040503050406030204" pitchFamily="18" charset="0"/>
+                          </a:rPr>
+                          <m:t>=1</m:t>
+                        </m:r>
+                      </m:e>
+                    </m:nary>
+                  </m:oMath>
+                </a14:m>
+                <a:endParaRPr lang="en-US" dirty="0"/>
+              </a:p>
+              <a:p>
+                <a:pPr lvl="1"/>
+                <a:r>
+                  <a:rPr lang="en-US" dirty="0"/>
+                  <a:t>                	          </a:t>
+                </a:r>
+                <a14:m>
+                  <m:oMath xmlns:m="http://schemas.openxmlformats.org/officeDocument/2006/math">
+                    <m:r>
+                      <a:rPr lang="en-US" b="0" i="1" smtClean="0">
+                        <a:latin typeface="Cambria Math" panose="02040503050406030204" pitchFamily="18" charset="0"/>
+                      </a:rPr>
+                      <m:t>𝑥</m:t>
+                    </m:r>
+                    <m:r>
+                      <a:rPr lang="en-US" b="0" i="1" smtClean="0">
+                        <a:latin typeface="Cambria Math" panose="02040503050406030204" pitchFamily="18" charset="0"/>
+                      </a:rPr>
+                      <m:t>, </m:t>
+                    </m:r>
+                    <m:sSub>
+                      <m:sSubPr>
+                        <m:ctrlPr>
+                          <a:rPr lang="en-US" b="0" i="1" smtClean="0">
+                            <a:latin typeface="Cambria Math" panose="02040503050406030204" pitchFamily="18" charset="0"/>
+                          </a:rPr>
+                        </m:ctrlPr>
+                      </m:sSubPr>
+                      <m:e>
+                        <m:r>
+                          <a:rPr lang="en-US" b="0" i="1" smtClean="0">
+                            <a:latin typeface="Cambria Math" panose="02040503050406030204" pitchFamily="18" charset="0"/>
+                          </a:rPr>
+                          <m:t>𝑥</m:t>
+                        </m:r>
+                      </m:e>
+                      <m:sub>
+                        <m:r>
+                          <a:rPr lang="en-US" b="0" i="1" smtClean="0">
+                            <a:latin typeface="Cambria Math" panose="02040503050406030204" pitchFamily="18" charset="0"/>
+                          </a:rPr>
+                          <m:t>𝑐𝑎𝑠h</m:t>
+                        </m:r>
+                      </m:sub>
+                    </m:sSub>
+                    <m:r>
+                      <a:rPr lang="en-US" b="0" i="1" smtClean="0">
+                        <a:latin typeface="Cambria Math" panose="02040503050406030204" pitchFamily="18" charset="0"/>
+                      </a:rPr>
+                      <m:t>≥0</m:t>
+                    </m:r>
+                  </m:oMath>
+                </a14:m>
+                <a:endParaRPr lang="en-US" dirty="0"/>
+              </a:p>
+              <a:p>
+                <a:pPr marL="742950" lvl="1" indent="-285750">
+                  <a:buFont typeface="Arial" panose="020B0604020202020204" pitchFamily="34" charset="0"/>
+                  <a:buChar char="•"/>
+                </a:pPr>
+                <a:r>
+                  <a:rPr lang="en-US" dirty="0"/>
+                  <a:t>and addition of </a:t>
+                </a:r>
+                <a14:m>
+                  <m:oMath xmlns:m="http://schemas.openxmlformats.org/officeDocument/2006/math">
+                    <m:sSub>
+                      <m:sSubPr>
+                        <m:ctrlPr>
+                          <a:rPr lang="en-US" b="0" i="1" smtClean="0">
+                            <a:latin typeface="Cambria Math" panose="02040503050406030204" pitchFamily="18" charset="0"/>
+                          </a:rPr>
+                        </m:ctrlPr>
+                      </m:sSubPr>
+                      <m:e>
+                        <m:r>
+                          <a:rPr lang="en-US" b="0" i="1" smtClean="0">
+                            <a:latin typeface="Cambria Math" panose="02040503050406030204" pitchFamily="18" charset="0"/>
+                          </a:rPr>
+                          <m:t>ℓ</m:t>
+                        </m:r>
+                      </m:e>
+                      <m:sub>
+                        <m:r>
+                          <a:rPr lang="en-US" b="0" i="1" smtClean="0">
+                            <a:latin typeface="Cambria Math" panose="02040503050406030204" pitchFamily="18" charset="0"/>
+                          </a:rPr>
+                          <m:t>1</m:t>
+                        </m:r>
+                      </m:sub>
+                    </m:sSub>
+                  </m:oMath>
+                </a14:m>
+                <a:r>
+                  <a:rPr lang="en-US" dirty="0"/>
+                  <a:t> and </a:t>
+                </a:r>
+                <a14:m>
+                  <m:oMath xmlns:m="http://schemas.openxmlformats.org/officeDocument/2006/math">
+                    <m:sSub>
+                      <m:sSubPr>
+                        <m:ctrlPr>
+                          <a:rPr lang="en-US" b="0" i="1" smtClean="0">
+                            <a:latin typeface="Cambria Math" panose="02040503050406030204" pitchFamily="18" charset="0"/>
+                          </a:rPr>
+                        </m:ctrlPr>
+                      </m:sSubPr>
+                      <m:e>
+                        <m:r>
+                          <a:rPr lang="en-US" b="0" i="1" smtClean="0">
+                            <a:latin typeface="Cambria Math" panose="02040503050406030204" pitchFamily="18" charset="0"/>
+                          </a:rPr>
+                          <m:t>ℓ</m:t>
+                        </m:r>
+                      </m:e>
+                      <m:sub>
+                        <m:r>
+                          <a:rPr lang="en-US" b="0" i="1" smtClean="0">
+                            <a:latin typeface="Cambria Math" panose="02040503050406030204" pitchFamily="18" charset="0"/>
+                          </a:rPr>
+                          <m:t>2</m:t>
+                        </m:r>
+                      </m:sub>
+                    </m:sSub>
+                  </m:oMath>
+                </a14:m>
+                <a:r>
+                  <a:rPr lang="en-US" dirty="0"/>
+                  <a:t> penalty terms:</a:t>
+                </a:r>
+              </a:p>
+              <a:p>
+                <a:pPr marL="1200150" lvl="2" indent="-285750">
+                  <a:buFont typeface="Arial" panose="020B0604020202020204" pitchFamily="34" charset="0"/>
+                  <a:buChar char="•"/>
+                </a:pPr>
+                <a:r>
+                  <a:rPr lang="en-US" dirty="0"/>
+                  <a:t>minimize </a:t>
+                </a:r>
+                <a14:m>
+                  <m:oMath xmlns:m="http://schemas.openxmlformats.org/officeDocument/2006/math">
+                    <m:sSup>
+                      <m:sSupPr>
+                        <m:ctrlPr>
+                          <a:rPr lang="en-US" b="0" i="1" smtClean="0">
+                            <a:latin typeface="Cambria Math" panose="02040503050406030204" pitchFamily="18" charset="0"/>
+                          </a:rPr>
+                        </m:ctrlPr>
+                      </m:sSupPr>
+                      <m:e>
+                        <m:r>
+                          <a:rPr lang="en-US" b="0" i="1" smtClean="0">
+                            <a:latin typeface="Cambria Math" panose="02040503050406030204" pitchFamily="18" charset="0"/>
+                          </a:rPr>
+                          <m:t>𝑥</m:t>
+                        </m:r>
+                      </m:e>
+                      <m:sup>
+                        <m:r>
+                          <a:rPr lang="en-US" b="0" i="1" smtClean="0">
+                            <a:latin typeface="Cambria Math" panose="02040503050406030204" pitchFamily="18" charset="0"/>
+                          </a:rPr>
+                          <m:t>𝑇</m:t>
+                        </m:r>
+                      </m:sup>
+                    </m:sSup>
+                    <m:r>
+                      <m:rPr>
+                        <m:sty m:val="p"/>
+                      </m:rPr>
+                      <a:rPr lang="en-US" b="0" i="0" smtClean="0">
+                        <a:latin typeface="Cambria Math" panose="02040503050406030204" pitchFamily="18" charset="0"/>
+                      </a:rPr>
+                      <m:t>Σx</m:t>
+                    </m:r>
+                    <m:r>
+                      <a:rPr lang="en-US" b="0" i="0" smtClean="0">
+                        <a:latin typeface="Cambria Math" panose="02040503050406030204" pitchFamily="18" charset="0"/>
+                      </a:rPr>
+                      <m:t>+</m:t>
+                    </m:r>
+                    <m:r>
+                      <a:rPr lang="en-US" b="0" i="1" smtClean="0">
+                        <a:latin typeface="Cambria Math" panose="02040503050406030204" pitchFamily="18" charset="0"/>
+                      </a:rPr>
+                      <m:t>𝛾</m:t>
+                    </m:r>
+                    <m:sSub>
+                      <m:sSubPr>
+                        <m:ctrlPr>
+                          <a:rPr lang="en-US" b="0" i="1" smtClean="0">
+                            <a:latin typeface="Cambria Math" panose="02040503050406030204" pitchFamily="18" charset="0"/>
+                          </a:rPr>
+                        </m:ctrlPr>
+                      </m:sSubPr>
+                      <m:e>
+                        <m:d>
+                          <m:dPr>
+                            <m:begChr m:val="|"/>
+                            <m:endChr m:val="|"/>
+                            <m:ctrlPr>
+                              <a:rPr lang="en-US" b="0" i="1" smtClean="0">
+                                <a:latin typeface="Cambria Math" panose="02040503050406030204" pitchFamily="18" charset="0"/>
+                              </a:rPr>
+                            </m:ctrlPr>
+                          </m:dPr>
+                          <m:e>
+                            <m:d>
+                              <m:dPr>
+                                <m:begChr m:val="|"/>
+                                <m:endChr m:val="|"/>
+                                <m:ctrlPr>
+                                  <a:rPr lang="en-US" b="0" i="1" smtClean="0">
+                                    <a:latin typeface="Cambria Math" panose="02040503050406030204" pitchFamily="18" charset="0"/>
+                                  </a:rPr>
+                                </m:ctrlPr>
+                              </m:dPr>
+                              <m:e>
+                                <m:r>
+                                  <a:rPr lang="en-US" b="0" i="1" smtClean="0">
+                                    <a:latin typeface="Cambria Math" panose="02040503050406030204" pitchFamily="18" charset="0"/>
+                                  </a:rPr>
+                                  <m:t>𝑥</m:t>
+                                </m:r>
+                              </m:e>
+                            </m:d>
+                          </m:e>
+                        </m:d>
+                      </m:e>
+                      <m:sub>
+                        <m:r>
+                          <a:rPr lang="en-US" b="0" i="1" smtClean="0">
+                            <a:latin typeface="Cambria Math" panose="02040503050406030204" pitchFamily="18" charset="0"/>
+                          </a:rPr>
+                          <m:t>1</m:t>
+                        </m:r>
+                      </m:sub>
+                    </m:sSub>
+                  </m:oMath>
+                </a14:m>
+                <a:endParaRPr lang="en-US" dirty="0"/>
+              </a:p>
+              <a:p>
+                <a:pPr marL="1200150" lvl="2" indent="-285750">
+                  <a:buFont typeface="Arial" panose="020B0604020202020204" pitchFamily="34" charset="0"/>
+                  <a:buChar char="•"/>
+                </a:pPr>
+                <a:r>
+                  <a:rPr lang="en-US" dirty="0"/>
+                  <a:t>minimize </a:t>
+                </a:r>
+                <a14:m>
+                  <m:oMath xmlns:m="http://schemas.openxmlformats.org/officeDocument/2006/math">
+                    <m:sSup>
+                      <m:sSupPr>
+                        <m:ctrlPr>
+                          <a:rPr lang="en-US" b="0" i="1" smtClean="0">
+                            <a:latin typeface="Cambria Math" panose="02040503050406030204" pitchFamily="18" charset="0"/>
+                          </a:rPr>
+                        </m:ctrlPr>
+                      </m:sSupPr>
+                      <m:e>
+                        <m:r>
+                          <a:rPr lang="en-US" b="0" i="1" smtClean="0">
+                            <a:latin typeface="Cambria Math" panose="02040503050406030204" pitchFamily="18" charset="0"/>
+                          </a:rPr>
+                          <m:t>𝑥</m:t>
+                        </m:r>
+                      </m:e>
+                      <m:sup>
+                        <m:r>
+                          <a:rPr lang="en-US" b="0" i="1" smtClean="0">
+                            <a:latin typeface="Cambria Math" panose="02040503050406030204" pitchFamily="18" charset="0"/>
+                          </a:rPr>
+                          <m:t>𝑇</m:t>
+                        </m:r>
+                      </m:sup>
+                    </m:sSup>
+                    <m:r>
+                      <m:rPr>
+                        <m:sty m:val="p"/>
+                      </m:rPr>
+                      <a:rPr lang="en-US" b="0" i="0" smtClean="0">
+                        <a:latin typeface="Cambria Math" panose="02040503050406030204" pitchFamily="18" charset="0"/>
+                      </a:rPr>
+                      <m:t>Σx</m:t>
+                    </m:r>
+                    <m:r>
+                      <a:rPr lang="en-US" b="0" i="0" smtClean="0">
+                        <a:latin typeface="Cambria Math" panose="02040503050406030204" pitchFamily="18" charset="0"/>
+                      </a:rPr>
+                      <m:t>+</m:t>
+                    </m:r>
+                    <m:r>
+                      <a:rPr lang="en-US" b="0" i="1" smtClean="0">
+                        <a:latin typeface="Cambria Math" panose="02040503050406030204" pitchFamily="18" charset="0"/>
+                      </a:rPr>
+                      <m:t>𝛾</m:t>
+                    </m:r>
+                    <m:sSubSup>
+                      <m:sSubSupPr>
+                        <m:ctrlPr>
+                          <a:rPr lang="en-US" b="0" i="1" smtClean="0">
+                            <a:latin typeface="Cambria Math" panose="02040503050406030204" pitchFamily="18" charset="0"/>
+                          </a:rPr>
+                        </m:ctrlPr>
+                      </m:sSubSupPr>
+                      <m:e>
+                        <m:d>
+                          <m:dPr>
+                            <m:begChr m:val="|"/>
+                            <m:endChr m:val="|"/>
+                            <m:ctrlPr>
+                              <a:rPr lang="en-US" b="0" i="1" smtClean="0">
+                                <a:latin typeface="Cambria Math" panose="02040503050406030204" pitchFamily="18" charset="0"/>
+                              </a:rPr>
+                            </m:ctrlPr>
+                          </m:dPr>
+                          <m:e>
+                            <m:d>
+                              <m:dPr>
+                                <m:begChr m:val="|"/>
+                                <m:endChr m:val="|"/>
+                                <m:ctrlPr>
+                                  <a:rPr lang="en-US" b="0" i="1" smtClean="0">
+                                    <a:latin typeface="Cambria Math" panose="02040503050406030204" pitchFamily="18" charset="0"/>
+                                  </a:rPr>
+                                </m:ctrlPr>
+                              </m:dPr>
+                              <m:e>
+                                <m:r>
+                                  <a:rPr lang="en-US" b="0" i="1" smtClean="0">
+                                    <a:latin typeface="Cambria Math" panose="02040503050406030204" pitchFamily="18" charset="0"/>
+                                  </a:rPr>
+                                  <m:t>𝑥</m:t>
+                                </m:r>
+                              </m:e>
+                            </m:d>
+                          </m:e>
+                        </m:d>
+                      </m:e>
+                      <m:sub>
+                        <m:r>
+                          <a:rPr lang="en-US" b="0" i="1" smtClean="0">
+                            <a:latin typeface="Cambria Math" panose="02040503050406030204" pitchFamily="18" charset="0"/>
+                          </a:rPr>
+                          <m:t>2</m:t>
+                        </m:r>
+                      </m:sub>
+                      <m:sup>
+                        <m:r>
+                          <a:rPr lang="en-US" b="0" i="1" smtClean="0">
+                            <a:latin typeface="Cambria Math" panose="02040503050406030204" pitchFamily="18" charset="0"/>
+                          </a:rPr>
+                          <m:t>2</m:t>
+                        </m:r>
+                      </m:sup>
+                    </m:sSubSup>
+                  </m:oMath>
+                </a14:m>
+                <a:endParaRPr lang="en-US" dirty="0"/>
+              </a:p>
+              <a:p>
+                <a:pPr marL="285750" indent="-285750">
+                  <a:buFont typeface="Arial" panose="020B0604020202020204" pitchFamily="34" charset="0"/>
+                  <a:buChar char="•"/>
+                </a:pPr>
+                <a:r>
+                  <a:rPr lang="en-US" dirty="0"/>
+                  <a:t>The only addition that improved the model after converting to the no shorting model was that of the risk-free asset. Neither the </a:t>
+                </a:r>
+                <a14:m>
+                  <m:oMath xmlns:m="http://schemas.openxmlformats.org/officeDocument/2006/math">
+                    <m:sSub>
+                      <m:sSubPr>
+                        <m:ctrlPr>
+                          <a:rPr lang="en-US" b="0" i="1" smtClean="0">
+                            <a:latin typeface="Cambria Math" panose="02040503050406030204" pitchFamily="18" charset="0"/>
+                          </a:rPr>
+                        </m:ctrlPr>
+                      </m:sSubPr>
+                      <m:e>
+                        <m:r>
+                          <a:rPr lang="en-US" b="0" i="1" smtClean="0">
+                            <a:latin typeface="Cambria Math" panose="02040503050406030204" pitchFamily="18" charset="0"/>
+                          </a:rPr>
+                          <m:t>ℓ</m:t>
+                        </m:r>
+                      </m:e>
+                      <m:sub>
+                        <m:r>
+                          <a:rPr lang="en-US" b="0" i="1" smtClean="0">
+                            <a:latin typeface="Cambria Math" panose="02040503050406030204" pitchFamily="18" charset="0"/>
+                          </a:rPr>
+                          <m:t>1</m:t>
+                        </m:r>
+                      </m:sub>
+                    </m:sSub>
+                  </m:oMath>
+                </a14:m>
+                <a:r>
+                  <a:rPr lang="en-US" dirty="0"/>
+                  <a:t> nor </a:t>
+                </a:r>
+                <a14:m>
+                  <m:oMath xmlns:m="http://schemas.openxmlformats.org/officeDocument/2006/math">
+                    <m:sSub>
+                      <m:sSubPr>
+                        <m:ctrlPr>
+                          <a:rPr lang="en-US" b="0" i="1" smtClean="0">
+                            <a:latin typeface="Cambria Math" panose="02040503050406030204" pitchFamily="18" charset="0"/>
+                          </a:rPr>
+                        </m:ctrlPr>
+                      </m:sSubPr>
+                      <m:e>
+                        <m:r>
+                          <a:rPr lang="en-US" b="0" i="1" smtClean="0">
+                            <a:latin typeface="Cambria Math" panose="02040503050406030204" pitchFamily="18" charset="0"/>
+                          </a:rPr>
+                          <m:t>ℓ</m:t>
+                        </m:r>
+                      </m:e>
+                      <m:sub>
+                        <m:r>
+                          <a:rPr lang="en-US" b="0" i="1" smtClean="0">
+                            <a:latin typeface="Cambria Math" panose="02040503050406030204" pitchFamily="18" charset="0"/>
+                          </a:rPr>
+                          <m:t>2</m:t>
+                        </m:r>
+                      </m:sub>
+                    </m:sSub>
+                  </m:oMath>
+                </a14:m>
+                <a:r>
+                  <a:rPr lang="en-US" dirty="0"/>
+                  <a:t> constraints improved the model which can be seen in the third graph to the left. The plot of the candidate </a:t>
+                </a:r>
+                <a14:m>
+                  <m:oMath xmlns:m="http://schemas.openxmlformats.org/officeDocument/2006/math">
+                    <m:sSub>
+                      <m:sSubPr>
+                        <m:ctrlPr>
+                          <a:rPr lang="en-US" b="0" i="1" smtClean="0">
+                            <a:latin typeface="Cambria Math" panose="02040503050406030204" pitchFamily="18" charset="0"/>
+                          </a:rPr>
+                        </m:ctrlPr>
+                      </m:sSubPr>
+                      <m:e>
+                        <m:r>
+                          <a:rPr lang="en-US" b="0" i="1" smtClean="0">
+                            <a:latin typeface="Cambria Math" panose="02040503050406030204" pitchFamily="18" charset="0"/>
+                          </a:rPr>
+                          <m:t>ℓ</m:t>
+                        </m:r>
+                      </m:e>
+                      <m:sub>
+                        <m:r>
+                          <a:rPr lang="en-US" b="0" i="1" smtClean="0">
+                            <a:latin typeface="Cambria Math" panose="02040503050406030204" pitchFamily="18" charset="0"/>
+                          </a:rPr>
+                          <m:t>2</m:t>
+                        </m:r>
+                      </m:sub>
+                    </m:sSub>
+                  </m:oMath>
+                </a14:m>
+                <a:r>
+                  <a:rPr lang="en-US" dirty="0"/>
+                  <a:t> penalty models is very similar. </a:t>
+                </a:r>
+              </a:p>
+              <a:p>
+                <a:pPr marL="285750" indent="-285750">
+                  <a:buFont typeface="Arial" panose="020B0604020202020204" pitchFamily="34" charset="0"/>
+                  <a:buChar char="•"/>
+                </a:pPr>
+                <a:r>
+                  <a:rPr lang="en-US" sz="1800" dirty="0"/>
+                  <a:t>Key take away: Optimization and prediction of financial data requires a much more complex model that a simple Markowitz model. </a:t>
+                </a:r>
+              </a:p>
+              <a:p>
+                <a:pPr marL="285750" indent="-285750">
+                  <a:buFont typeface="Arial" panose="020B0604020202020204" pitchFamily="34" charset="0"/>
+                  <a:buChar char="•"/>
+                </a:pPr>
+                <a:r>
+                  <a:rPr lang="en-US" sz="1800" dirty="0"/>
+                  <a:t>Next time, it would be beneficial to compare other model types, such as a Sharpe model or CVaR model. </a:t>
+                </a:r>
+              </a:p>
+              <a:p>
+                <a:pPr marL="285750" indent="-285750">
+                  <a:buFont typeface="Arial" panose="020B0604020202020204" pitchFamily="34" charset="0"/>
+                  <a:buChar char="•"/>
+                </a:pPr>
+                <a:endParaRPr lang="en-US" dirty="0"/>
+              </a:p>
+            </p:txBody>
+          </p:sp>
+        </mc:Choice>
+        <mc:Fallback>
+          <p:sp>
+            <p:nvSpPr>
+              <p:cNvPr id="10" name="TextBox 9">
+                <a:extLst>
+                  <a:ext uri="{FF2B5EF4-FFF2-40B4-BE49-F238E27FC236}">
+                    <a16:creationId xmlns:a16="http://schemas.microsoft.com/office/drawing/2014/main" id="{06C91F09-433D-B0C5-D55A-F602E4733882}"/>
+                  </a:ext>
+                </a:extLst>
+              </p:cNvPr>
+              <p:cNvSpPr txBox="1">
+                <a:spLocks noRot="1" noChangeAspect="1" noMove="1" noResize="1" noEditPoints="1" noAdjustHandles="1" noChangeArrowheads="1" noChangeShapeType="1" noTextEdit="1"/>
+              </p:cNvSpPr>
+              <p:nvPr/>
+            </p:nvSpPr>
+            <p:spPr>
+              <a:xfrm>
+                <a:off x="4100320" y="1259808"/>
+                <a:ext cx="7409121" cy="5582426"/>
+              </a:xfrm>
+              <a:prstGeom prst="rect">
+                <a:avLst/>
+              </a:prstGeom>
+              <a:blipFill>
+                <a:blip r:embed="rId6"/>
+                <a:stretch>
+                  <a:fillRect l="-576" t="-546" r="-1235"/>
+                </a:stretch>
+              </a:blipFill>
+            </p:spPr>
+            <p:txBody>
+              <a:bodyPr/>
+              <a:lstStyle/>
+              <a:p>
+                <a:r>
+                  <a:rPr lang="en-US">
+                    <a:noFill/>
+                  </a:rPr>
+                  <a:t> </a:t>
+                </a:r>
+              </a:p>
+            </p:txBody>
+          </p:sp>
+        </mc:Fallback>
+      </mc:AlternateContent>
     </p:spTree>
     <p:extLst>
       <p:ext uri="{BB962C8B-B14F-4D97-AF65-F5344CB8AC3E}">
@@ -6713,4 +7670,319 @@
     </a:ext>
   </a:extLst>
 </a:theme>
+</file>
+
+<file path=ppt/theme/theme2.xml><?xml version="1.0" encoding="utf-8"?>
+<a:theme xmlns:a="http://schemas.openxmlformats.org/drawingml/2006/main" name="Office Theme">
+  <a:themeElements>
+    <a:clrScheme name="Office">
+      <a:dk1>
+        <a:sysClr val="windowText" lastClr="000000"/>
+      </a:dk1>
+      <a:lt1>
+        <a:sysClr val="window" lastClr="FFFFFF"/>
+      </a:lt1>
+      <a:dk2>
+        <a:srgbClr val="0E2841"/>
+      </a:dk2>
+      <a:lt2>
+        <a:srgbClr val="E8E8E8"/>
+      </a:lt2>
+      <a:accent1>
+        <a:srgbClr val="156082"/>
+      </a:accent1>
+      <a:accent2>
+        <a:srgbClr val="E97132"/>
+      </a:accent2>
+      <a:accent3>
+        <a:srgbClr val="196B24"/>
+      </a:accent3>
+      <a:accent4>
+        <a:srgbClr val="0F9ED5"/>
+      </a:accent4>
+      <a:accent5>
+        <a:srgbClr val="A02B93"/>
+      </a:accent5>
+      <a:accent6>
+        <a:srgbClr val="4EA72E"/>
+      </a:accent6>
+      <a:hlink>
+        <a:srgbClr val="467886"/>
+      </a:hlink>
+      <a:folHlink>
+        <a:srgbClr val="96607D"/>
+      </a:folHlink>
+    </a:clrScheme>
+    <a:fontScheme name="Office">
+      <a:majorFont>
+        <a:latin typeface="Aptos Display" panose="02110004020202020204"/>
+        <a:ea typeface=""/>
+        <a:cs typeface=""/>
+        <a:font script="Jpan" typeface="游ゴシック Light"/>
+        <a:font script="Hang" typeface="맑은 고딕"/>
+        <a:font script="Hans" typeface="等线 Light"/>
+        <a:font script="Hant" typeface="新細明體"/>
+        <a:font script="Arab" typeface="Times New Roman"/>
+        <a:font script="Hebr" typeface="Times New Roman"/>
+        <a:font script="Thai" typeface="Angsana New"/>
+        <a:font script="Ethi" typeface="Nyala"/>
+        <a:font script="Beng" typeface="Vrinda"/>
+        <a:font script="Gujr" typeface="Shruti"/>
+        <a:font script="Khmr" typeface="MoolBoran"/>
+        <a:font script="Knda" typeface="Tunga"/>
+        <a:font script="Guru" typeface="Raavi"/>
+        <a:font script="Cans" typeface="Euphemia"/>
+        <a:font script="Cher" typeface="Plantagenet Cherokee"/>
+        <a:font script="Yiii" typeface="Microsoft Yi Baiti"/>
+        <a:font script="Tibt" typeface="Microsoft Himalaya"/>
+        <a:font script="Thaa" typeface="MV Boli"/>
+        <a:font script="Deva" typeface="Mangal"/>
+        <a:font script="Telu" typeface="Gautami"/>
+        <a:font script="Taml" typeface="Latha"/>
+        <a:font script="Syrc" typeface="Estrangelo Edessa"/>
+        <a:font script="Orya" typeface="Kalinga"/>
+        <a:font script="Mlym" typeface="Kartika"/>
+        <a:font script="Laoo" typeface="DokChampa"/>
+        <a:font script="Sinh" typeface="Iskoola Pota"/>
+        <a:font script="Mong" typeface="Mongolian Baiti"/>
+        <a:font script="Viet" typeface="Times New Roman"/>
+        <a:font script="Uigh" typeface="Microsoft Uighur"/>
+        <a:font script="Geor" typeface="Sylfaen"/>
+        <a:font script="Armn" typeface="Arial"/>
+        <a:font script="Bugi" typeface="Leelawadee UI"/>
+        <a:font script="Bopo" typeface="Microsoft JhengHei"/>
+        <a:font script="Java" typeface="Javanese Text"/>
+        <a:font script="Lisu" typeface="Segoe UI"/>
+        <a:font script="Mymr" typeface="Myanmar Text"/>
+        <a:font script="Nkoo" typeface="Ebrima"/>
+        <a:font script="Olck" typeface="Nirmala UI"/>
+        <a:font script="Osma" typeface="Ebrima"/>
+        <a:font script="Phag" typeface="Phagspa"/>
+        <a:font script="Syrn" typeface="Estrangelo Edessa"/>
+        <a:font script="Syrj" typeface="Estrangelo Edessa"/>
+        <a:font script="Syre" typeface="Estrangelo Edessa"/>
+        <a:font script="Sora" typeface="Nirmala UI"/>
+        <a:font script="Tale" typeface="Microsoft Tai Le"/>
+        <a:font script="Talu" typeface="Microsoft New Tai Lue"/>
+        <a:font script="Tfng" typeface="Ebrima"/>
+      </a:majorFont>
+      <a:minorFont>
+        <a:latin typeface="Aptos" panose="02110004020202020204"/>
+        <a:ea typeface=""/>
+        <a:cs typeface=""/>
+        <a:font script="Jpan" typeface="游ゴシック"/>
+        <a:font script="Hang" typeface="맑은 고딕"/>
+        <a:font script="Hans" typeface="等线"/>
+        <a:font script="Hant" typeface="新細明體"/>
+        <a:font script="Arab" typeface="Arial"/>
+        <a:font script="Hebr" typeface="Arial"/>
+        <a:font script="Thai" typeface="Cordia New"/>
+        <a:font script="Ethi" typeface="Nyala"/>
+        <a:font script="Beng" typeface="Vrinda"/>
+        <a:font script="Gujr" typeface="Shruti"/>
+        <a:font script="Khmr" typeface="DaunPenh"/>
+        <a:font script="Knda" typeface="Tunga"/>
+        <a:font script="Guru" typeface="Raavi"/>
+        <a:font script="Cans" typeface="Euphemia"/>
+        <a:font script="Cher" typeface="Plantagenet Cherokee"/>
+        <a:font script="Yiii" typeface="Microsoft Yi Baiti"/>
+        <a:font script="Tibt" typeface="Microsoft Himalaya"/>
+        <a:font script="Thaa" typeface="MV Boli"/>
+        <a:font script="Deva" typeface="Mangal"/>
+        <a:font script="Telu" typeface="Gautami"/>
+        <a:font script="Taml" typeface="Latha"/>
+        <a:font script="Syrc" typeface="Estrangelo Edessa"/>
+        <a:font script="Orya" typeface="Kalinga"/>
+        <a:font script="Mlym" typeface="Kartika"/>
+        <a:font script="Laoo" typeface="DokChampa"/>
+        <a:font script="Sinh" typeface="Iskoola Pota"/>
+        <a:font script="Mong" typeface="Mongolian Baiti"/>
+        <a:font script="Viet" typeface="Arial"/>
+        <a:font script="Uigh" typeface="Microsoft Uighur"/>
+        <a:font script="Geor" typeface="Sylfaen"/>
+        <a:font script="Armn" typeface="Arial"/>
+        <a:font script="Bugi" typeface="Leelawadee UI"/>
+        <a:font script="Bopo" typeface="Microsoft JhengHei"/>
+        <a:font script="Java" typeface="Javanese Text"/>
+        <a:font script="Lisu" typeface="Segoe UI"/>
+        <a:font script="Mymr" typeface="Myanmar Text"/>
+        <a:font script="Nkoo" typeface="Ebrima"/>
+        <a:font script="Olck" typeface="Nirmala UI"/>
+        <a:font script="Osma" typeface="Ebrima"/>
+        <a:font script="Phag" typeface="Phagspa"/>
+        <a:font script="Syrn" typeface="Estrangelo Edessa"/>
+        <a:font script="Syrj" typeface="Estrangelo Edessa"/>
+        <a:font script="Syre" typeface="Estrangelo Edessa"/>
+        <a:font script="Sora" typeface="Nirmala UI"/>
+        <a:font script="Tale" typeface="Microsoft Tai Le"/>
+        <a:font script="Talu" typeface="Microsoft New Tai Lue"/>
+        <a:font script="Tfng" typeface="Ebrima"/>
+      </a:minorFont>
+    </a:fontScheme>
+    <a:fmtScheme name="Office">
+      <a:fillStyleLst>
+        <a:solidFill>
+          <a:schemeClr val="phClr"/>
+        </a:solidFill>
+        <a:gradFill rotWithShape="1">
+          <a:gsLst>
+            <a:gs pos="0">
+              <a:schemeClr val="phClr">
+                <a:lumMod val="110000"/>
+                <a:satMod val="105000"/>
+                <a:tint val="67000"/>
+              </a:schemeClr>
+            </a:gs>
+            <a:gs pos="50000">
+              <a:schemeClr val="phClr">
+                <a:lumMod val="105000"/>
+                <a:satMod val="103000"/>
+                <a:tint val="73000"/>
+              </a:schemeClr>
+            </a:gs>
+            <a:gs pos="100000">
+              <a:schemeClr val="phClr">
+                <a:lumMod val="105000"/>
+                <a:satMod val="109000"/>
+                <a:tint val="81000"/>
+              </a:schemeClr>
+            </a:gs>
+          </a:gsLst>
+          <a:lin ang="5400000" scaled="0"/>
+        </a:gradFill>
+        <a:gradFill rotWithShape="1">
+          <a:gsLst>
+            <a:gs pos="0">
+              <a:schemeClr val="phClr">
+                <a:satMod val="103000"/>
+                <a:lumMod val="102000"/>
+                <a:tint val="94000"/>
+              </a:schemeClr>
+            </a:gs>
+            <a:gs pos="50000">
+              <a:schemeClr val="phClr">
+                <a:satMod val="110000"/>
+                <a:lumMod val="100000"/>
+                <a:shade val="100000"/>
+              </a:schemeClr>
+            </a:gs>
+            <a:gs pos="100000">
+              <a:schemeClr val="phClr">
+                <a:lumMod val="99000"/>
+                <a:satMod val="120000"/>
+                <a:shade val="78000"/>
+              </a:schemeClr>
+            </a:gs>
+          </a:gsLst>
+          <a:lin ang="5400000" scaled="0"/>
+        </a:gradFill>
+      </a:fillStyleLst>
+      <a:lnStyleLst>
+        <a:ln w="12700" cap="flat" cmpd="sng" algn="ctr">
+          <a:solidFill>
+            <a:schemeClr val="phClr"/>
+          </a:solidFill>
+          <a:prstDash val="solid"/>
+          <a:miter lim="800000"/>
+        </a:ln>
+        <a:ln w="19050" cap="flat" cmpd="sng" algn="ctr">
+          <a:solidFill>
+            <a:schemeClr val="phClr"/>
+          </a:solidFill>
+          <a:prstDash val="solid"/>
+          <a:miter lim="800000"/>
+        </a:ln>
+        <a:ln w="25400" cap="flat" cmpd="sng" algn="ctr">
+          <a:solidFill>
+            <a:schemeClr val="phClr"/>
+          </a:solidFill>
+          <a:prstDash val="solid"/>
+          <a:miter lim="800000"/>
+        </a:ln>
+      </a:lnStyleLst>
+      <a:effectStyleLst>
+        <a:effectStyle>
+          <a:effectLst/>
+        </a:effectStyle>
+        <a:effectStyle>
+          <a:effectLst/>
+        </a:effectStyle>
+        <a:effectStyle>
+          <a:effectLst>
+            <a:outerShdw blurRad="57150" dist="19050" dir="5400000" algn="ctr" rotWithShape="0">
+              <a:srgbClr val="000000">
+                <a:alpha val="63000"/>
+              </a:srgbClr>
+            </a:outerShdw>
+          </a:effectLst>
+        </a:effectStyle>
+      </a:effectStyleLst>
+      <a:bgFillStyleLst>
+        <a:solidFill>
+          <a:schemeClr val="phClr"/>
+        </a:solidFill>
+        <a:solidFill>
+          <a:schemeClr val="phClr">
+            <a:tint val="95000"/>
+            <a:satMod val="170000"/>
+          </a:schemeClr>
+        </a:solidFill>
+        <a:gradFill rotWithShape="1">
+          <a:gsLst>
+            <a:gs pos="0">
+              <a:schemeClr val="phClr">
+                <a:tint val="93000"/>
+                <a:satMod val="150000"/>
+                <a:shade val="98000"/>
+                <a:lumMod val="102000"/>
+              </a:schemeClr>
+            </a:gs>
+            <a:gs pos="50000">
+              <a:schemeClr val="phClr">
+                <a:tint val="98000"/>
+                <a:satMod val="130000"/>
+                <a:shade val="90000"/>
+                <a:lumMod val="103000"/>
+              </a:schemeClr>
+            </a:gs>
+            <a:gs pos="100000">
+              <a:schemeClr val="phClr">
+                <a:shade val="63000"/>
+                <a:satMod val="120000"/>
+              </a:schemeClr>
+            </a:gs>
+          </a:gsLst>
+          <a:lin ang="5400000" scaled="0"/>
+        </a:gradFill>
+      </a:bgFillStyleLst>
+    </a:fmtScheme>
+  </a:themeElements>
+  <a:objectDefaults>
+    <a:lnDef>
+      <a:spPr/>
+      <a:bodyPr/>
+      <a:lstStyle/>
+      <a:style>
+        <a:lnRef idx="2">
+          <a:schemeClr val="accent1"/>
+        </a:lnRef>
+        <a:fillRef idx="0">
+          <a:schemeClr val="accent1"/>
+        </a:fillRef>
+        <a:effectRef idx="1">
+          <a:schemeClr val="accent1"/>
+        </a:effectRef>
+        <a:fontRef idx="minor">
+          <a:schemeClr val="tx1"/>
+        </a:fontRef>
+      </a:style>
+    </a:lnDef>
+  </a:objectDefaults>
+  <a:extraClrSchemeLst/>
+  <a:extLst>
+    <a:ext uri="{05A4C25C-085E-4340-85A3-A5531E510DB2}">
+      <thm15:themeFamily xmlns:thm15="http://schemas.microsoft.com/office/thememl/2012/main" name="Office Theme" id="{2E142A2C-CD16-42D6-873A-C26D2A0506FA}" vid="{1BDDFF52-6CD6-40A5-AB3C-68EB2F1E4D0A}"/>
+    </a:ext>
+  </a:extLst>
+</a:theme>
 </file>
</xml_diff>